<commit_message>
added more html and initial js exercise draft
</commit_message>
<xml_diff>
--- a/static/files/graphics.pptx
+++ b/static/files/graphics.pptx
@@ -9,7 +9,10 @@
     <p:sldId id="257" r:id="rId3"/>
     <p:sldId id="258" r:id="rId4"/>
     <p:sldId id="259" r:id="rId5"/>
-    <p:sldId id="260" r:id="rId6"/>
+    <p:sldId id="262" r:id="rId6"/>
+    <p:sldId id="263" r:id="rId7"/>
+    <p:sldId id="260" r:id="rId8"/>
+    <p:sldId id="261" r:id="rId9"/>
   </p:sldIdLst>
   <p:sldSz cx="12192000" cy="6858000"/>
   <p:notesSz cx="6858000" cy="9144000"/>
@@ -9981,6 +9984,984 @@
           <a:chExt cx="0" cy="0"/>
         </a:xfrm>
       </p:grpSpPr>
+      <p:pic>
+        <p:nvPicPr>
+          <p:cNvPr id="8" name="Graphic 7" descr="User outline">
+            <a:extLst>
+              <a:ext uri="{FF2B5EF4-FFF2-40B4-BE49-F238E27FC236}">
+                <a16:creationId xmlns:a16="http://schemas.microsoft.com/office/drawing/2014/main" id="{8F40C406-7117-2CE9-673D-7D4F13A1122B}"/>
+              </a:ext>
+            </a:extLst>
+          </p:cNvPr>
+          <p:cNvPicPr>
+            <a:picLocks noChangeAspect="1"/>
+          </p:cNvPicPr>
+          <p:nvPr/>
+        </p:nvPicPr>
+        <p:blipFill>
+          <a:blip r:embed="rId2">
+            <a:extLst>
+              <a:ext uri="{96DAC541-7B7A-43D3-8B79-37D633B846F1}">
+                <asvg:svgBlip xmlns:asvg="http://schemas.microsoft.com/office/drawing/2016/SVG/main" r:embed="rId3"/>
+              </a:ext>
+            </a:extLst>
+          </a:blip>
+          <a:stretch>
+            <a:fillRect/>
+          </a:stretch>
+        </p:blipFill>
+        <p:spPr>
+          <a:xfrm>
+            <a:off x="1219200" y="2400300"/>
+            <a:ext cx="1854200" cy="1854200"/>
+          </a:xfrm>
+          <a:prstGeom prst="rect">
+            <a:avLst/>
+          </a:prstGeom>
+        </p:spPr>
+      </p:pic>
+      <p:sp>
+        <p:nvSpPr>
+          <p:cNvPr id="9" name="TextBox 8">
+            <a:extLst>
+              <a:ext uri="{FF2B5EF4-FFF2-40B4-BE49-F238E27FC236}">
+                <a16:creationId xmlns:a16="http://schemas.microsoft.com/office/drawing/2014/main" id="{8324DA46-BFBE-A1BC-0033-E14221BA76A5}"/>
+              </a:ext>
+            </a:extLst>
+          </p:cNvPr>
+          <p:cNvSpPr txBox="1"/>
+          <p:nvPr/>
+        </p:nvSpPr>
+        <p:spPr>
+          <a:xfrm>
+            <a:off x="1594578" y="2030968"/>
+            <a:ext cx="1103444" cy="369332"/>
+          </a:xfrm>
+          <a:prstGeom prst="rect">
+            <a:avLst/>
+          </a:prstGeom>
+          <a:noFill/>
+        </p:spPr>
+        <p:txBody>
+          <a:bodyPr wrap="none" rtlCol="0">
+            <a:spAutoFit/>
+          </a:bodyPr>
+          <a:lstStyle/>
+          <a:p>
+            <a:r>
+              <a:rPr lang="en-DE" dirty="0"/>
+              <a:t>&lt;guest1&gt;</a:t>
+            </a:r>
+          </a:p>
+        </p:txBody>
+      </p:sp>
+      <p:sp>
+        <p:nvSpPr>
+          <p:cNvPr id="10" name="TextBox 9">
+            <a:extLst>
+              <a:ext uri="{FF2B5EF4-FFF2-40B4-BE49-F238E27FC236}">
+                <a16:creationId xmlns:a16="http://schemas.microsoft.com/office/drawing/2014/main" id="{41721BAE-8F22-4679-4C02-C17E7574002F}"/>
+              </a:ext>
+            </a:extLst>
+          </p:cNvPr>
+          <p:cNvSpPr txBox="1"/>
+          <p:nvPr/>
+        </p:nvSpPr>
+        <p:spPr>
+          <a:xfrm>
+            <a:off x="1562358" y="4254500"/>
+            <a:ext cx="1167884" cy="369332"/>
+          </a:xfrm>
+          <a:prstGeom prst="rect">
+            <a:avLst/>
+          </a:prstGeom>
+          <a:noFill/>
+        </p:spPr>
+        <p:txBody>
+          <a:bodyPr wrap="none" rtlCol="0">
+            <a:spAutoFit/>
+          </a:bodyPr>
+          <a:lstStyle/>
+          <a:p>
+            <a:r>
+              <a:rPr lang="en-DE" dirty="0"/>
+              <a:t>&lt;/guest1&gt;</a:t>
+            </a:r>
+          </a:p>
+        </p:txBody>
+      </p:sp>
+      <p:pic>
+        <p:nvPicPr>
+          <p:cNvPr id="12" name="Graphic 11" descr="User outline">
+            <a:extLst>
+              <a:ext uri="{FF2B5EF4-FFF2-40B4-BE49-F238E27FC236}">
+                <a16:creationId xmlns:a16="http://schemas.microsoft.com/office/drawing/2014/main" id="{08536D02-25F1-142F-03C2-2C980AE0A1FC}"/>
+              </a:ext>
+            </a:extLst>
+          </p:cNvPr>
+          <p:cNvPicPr>
+            <a:picLocks noChangeAspect="1"/>
+          </p:cNvPicPr>
+          <p:nvPr/>
+        </p:nvPicPr>
+        <p:blipFill>
+          <a:blip r:embed="rId2">
+            <a:extLst>
+              <a:ext uri="{96DAC541-7B7A-43D3-8B79-37D633B846F1}">
+                <asvg:svgBlip xmlns:asvg="http://schemas.microsoft.com/office/drawing/2016/SVG/main" r:embed="rId3"/>
+              </a:ext>
+            </a:extLst>
+          </a:blip>
+          <a:stretch>
+            <a:fillRect/>
+          </a:stretch>
+        </p:blipFill>
+        <p:spPr>
+          <a:xfrm>
+            <a:off x="3105620" y="2400300"/>
+            <a:ext cx="1854200" cy="1854200"/>
+          </a:xfrm>
+          <a:prstGeom prst="rect">
+            <a:avLst/>
+          </a:prstGeom>
+        </p:spPr>
+      </p:pic>
+      <p:sp>
+        <p:nvSpPr>
+          <p:cNvPr id="13" name="TextBox 12">
+            <a:extLst>
+              <a:ext uri="{FF2B5EF4-FFF2-40B4-BE49-F238E27FC236}">
+                <a16:creationId xmlns:a16="http://schemas.microsoft.com/office/drawing/2014/main" id="{1E03F521-DFA7-D806-11B2-F3B05406C14B}"/>
+              </a:ext>
+            </a:extLst>
+          </p:cNvPr>
+          <p:cNvSpPr txBox="1"/>
+          <p:nvPr/>
+        </p:nvSpPr>
+        <p:spPr>
+          <a:xfrm>
+            <a:off x="3480998" y="2030968"/>
+            <a:ext cx="1103444" cy="369332"/>
+          </a:xfrm>
+          <a:prstGeom prst="rect">
+            <a:avLst/>
+          </a:prstGeom>
+          <a:noFill/>
+        </p:spPr>
+        <p:txBody>
+          <a:bodyPr wrap="none" rtlCol="0">
+            <a:spAutoFit/>
+          </a:bodyPr>
+          <a:lstStyle/>
+          <a:p>
+            <a:r>
+              <a:rPr lang="en-DE" dirty="0"/>
+              <a:t>&lt;guest2&gt;</a:t>
+            </a:r>
+          </a:p>
+        </p:txBody>
+      </p:sp>
+      <p:sp>
+        <p:nvSpPr>
+          <p:cNvPr id="14" name="TextBox 13">
+            <a:extLst>
+              <a:ext uri="{FF2B5EF4-FFF2-40B4-BE49-F238E27FC236}">
+                <a16:creationId xmlns:a16="http://schemas.microsoft.com/office/drawing/2014/main" id="{B4395035-97E5-008D-09BF-7412FF2A828C}"/>
+              </a:ext>
+            </a:extLst>
+          </p:cNvPr>
+          <p:cNvSpPr txBox="1"/>
+          <p:nvPr/>
+        </p:nvSpPr>
+        <p:spPr>
+          <a:xfrm>
+            <a:off x="3448778" y="4254500"/>
+            <a:ext cx="1167884" cy="369332"/>
+          </a:xfrm>
+          <a:prstGeom prst="rect">
+            <a:avLst/>
+          </a:prstGeom>
+          <a:noFill/>
+        </p:spPr>
+        <p:txBody>
+          <a:bodyPr wrap="none" rtlCol="0">
+            <a:spAutoFit/>
+          </a:bodyPr>
+          <a:lstStyle/>
+          <a:p>
+            <a:r>
+              <a:rPr lang="en-DE" dirty="0"/>
+              <a:t>&lt;/guest2&gt;</a:t>
+            </a:r>
+          </a:p>
+        </p:txBody>
+      </p:sp>
+      <p:pic>
+        <p:nvPicPr>
+          <p:cNvPr id="15" name="Graphic 14" descr="User outline">
+            <a:extLst>
+              <a:ext uri="{FF2B5EF4-FFF2-40B4-BE49-F238E27FC236}">
+                <a16:creationId xmlns:a16="http://schemas.microsoft.com/office/drawing/2014/main" id="{E2C80FE1-2EED-CA91-DFEA-4CF15A0E3A79}"/>
+              </a:ext>
+            </a:extLst>
+          </p:cNvPr>
+          <p:cNvPicPr>
+            <a:picLocks noChangeAspect="1"/>
+          </p:cNvPicPr>
+          <p:nvPr/>
+        </p:nvPicPr>
+        <p:blipFill>
+          <a:blip r:embed="rId2">
+            <a:extLst>
+              <a:ext uri="{96DAC541-7B7A-43D3-8B79-37D633B846F1}">
+                <asvg:svgBlip xmlns:asvg="http://schemas.microsoft.com/office/drawing/2016/SVG/main" r:embed="rId3"/>
+              </a:ext>
+            </a:extLst>
+          </a:blip>
+          <a:stretch>
+            <a:fillRect/>
+          </a:stretch>
+        </p:blipFill>
+        <p:spPr>
+          <a:xfrm>
+            <a:off x="4959820" y="2400300"/>
+            <a:ext cx="1854200" cy="1854200"/>
+          </a:xfrm>
+          <a:prstGeom prst="rect">
+            <a:avLst/>
+          </a:prstGeom>
+        </p:spPr>
+      </p:pic>
+      <p:sp>
+        <p:nvSpPr>
+          <p:cNvPr id="17" name="TextBox 16">
+            <a:extLst>
+              <a:ext uri="{FF2B5EF4-FFF2-40B4-BE49-F238E27FC236}">
+                <a16:creationId xmlns:a16="http://schemas.microsoft.com/office/drawing/2014/main" id="{49C9E987-FC80-DF73-1916-3D57009995F9}"/>
+              </a:ext>
+            </a:extLst>
+          </p:cNvPr>
+          <p:cNvSpPr txBox="1"/>
+          <p:nvPr/>
+        </p:nvSpPr>
+        <p:spPr>
+          <a:xfrm>
+            <a:off x="5335198" y="2030968"/>
+            <a:ext cx="1103444" cy="369332"/>
+          </a:xfrm>
+          <a:prstGeom prst="rect">
+            <a:avLst/>
+          </a:prstGeom>
+          <a:noFill/>
+        </p:spPr>
+        <p:txBody>
+          <a:bodyPr wrap="none" rtlCol="0">
+            <a:spAutoFit/>
+          </a:bodyPr>
+          <a:lstStyle/>
+          <a:p>
+            <a:r>
+              <a:rPr lang="en-DE" dirty="0"/>
+              <a:t>&lt;guest3&gt;</a:t>
+            </a:r>
+          </a:p>
+        </p:txBody>
+      </p:sp>
+      <p:sp>
+        <p:nvSpPr>
+          <p:cNvPr id="18" name="TextBox 17">
+            <a:extLst>
+              <a:ext uri="{FF2B5EF4-FFF2-40B4-BE49-F238E27FC236}">
+                <a16:creationId xmlns:a16="http://schemas.microsoft.com/office/drawing/2014/main" id="{9726113D-1839-73A0-04EE-8BE6DB8C25A3}"/>
+              </a:ext>
+            </a:extLst>
+          </p:cNvPr>
+          <p:cNvSpPr txBox="1"/>
+          <p:nvPr/>
+        </p:nvSpPr>
+        <p:spPr>
+          <a:xfrm>
+            <a:off x="5302978" y="4254500"/>
+            <a:ext cx="1167884" cy="369332"/>
+          </a:xfrm>
+          <a:prstGeom prst="rect">
+            <a:avLst/>
+          </a:prstGeom>
+          <a:noFill/>
+        </p:spPr>
+        <p:txBody>
+          <a:bodyPr wrap="none" rtlCol="0">
+            <a:spAutoFit/>
+          </a:bodyPr>
+          <a:lstStyle/>
+          <a:p>
+            <a:r>
+              <a:rPr lang="en-DE" dirty="0"/>
+              <a:t>&lt;/guest3&gt;</a:t>
+            </a:r>
+          </a:p>
+        </p:txBody>
+      </p:sp>
+      <p:pic>
+        <p:nvPicPr>
+          <p:cNvPr id="23" name="Graphic 22" descr="User outline">
+            <a:extLst>
+              <a:ext uri="{FF2B5EF4-FFF2-40B4-BE49-F238E27FC236}">
+                <a16:creationId xmlns:a16="http://schemas.microsoft.com/office/drawing/2014/main" id="{266127ED-2C8B-55F5-9335-A313A7ECD0DC}"/>
+              </a:ext>
+            </a:extLst>
+          </p:cNvPr>
+          <p:cNvPicPr>
+            <a:picLocks noChangeAspect="1"/>
+          </p:cNvPicPr>
+          <p:nvPr/>
+        </p:nvPicPr>
+        <p:blipFill>
+          <a:blip r:embed="rId2">
+            <a:extLst>
+              <a:ext uri="{96DAC541-7B7A-43D3-8B79-37D633B846F1}">
+                <asvg:svgBlip xmlns:asvg="http://schemas.microsoft.com/office/drawing/2016/SVG/main" r:embed="rId3"/>
+              </a:ext>
+            </a:extLst>
+          </a:blip>
+          <a:stretch>
+            <a:fillRect/>
+          </a:stretch>
+        </p:blipFill>
+        <p:spPr>
+          <a:xfrm>
+            <a:off x="6814020" y="2400300"/>
+            <a:ext cx="1854200" cy="1854200"/>
+          </a:xfrm>
+          <a:prstGeom prst="rect">
+            <a:avLst/>
+          </a:prstGeom>
+        </p:spPr>
+      </p:pic>
+      <p:sp>
+        <p:nvSpPr>
+          <p:cNvPr id="24" name="TextBox 23">
+            <a:extLst>
+              <a:ext uri="{FF2B5EF4-FFF2-40B4-BE49-F238E27FC236}">
+                <a16:creationId xmlns:a16="http://schemas.microsoft.com/office/drawing/2014/main" id="{069AF07C-9D51-EAC5-0337-4A40416AC950}"/>
+              </a:ext>
+            </a:extLst>
+          </p:cNvPr>
+          <p:cNvSpPr txBox="1"/>
+          <p:nvPr/>
+        </p:nvSpPr>
+        <p:spPr>
+          <a:xfrm>
+            <a:off x="7189398" y="2030968"/>
+            <a:ext cx="1103444" cy="369332"/>
+          </a:xfrm>
+          <a:prstGeom prst="rect">
+            <a:avLst/>
+          </a:prstGeom>
+          <a:noFill/>
+        </p:spPr>
+        <p:txBody>
+          <a:bodyPr wrap="none" rtlCol="0">
+            <a:spAutoFit/>
+          </a:bodyPr>
+          <a:lstStyle/>
+          <a:p>
+            <a:r>
+              <a:rPr lang="en-DE" dirty="0"/>
+              <a:t>&lt;guest4&gt;</a:t>
+            </a:r>
+          </a:p>
+        </p:txBody>
+      </p:sp>
+      <p:sp>
+        <p:nvSpPr>
+          <p:cNvPr id="25" name="TextBox 24">
+            <a:extLst>
+              <a:ext uri="{FF2B5EF4-FFF2-40B4-BE49-F238E27FC236}">
+                <a16:creationId xmlns:a16="http://schemas.microsoft.com/office/drawing/2014/main" id="{ADE39639-36BA-A61C-700D-B5BC921F12A8}"/>
+              </a:ext>
+            </a:extLst>
+          </p:cNvPr>
+          <p:cNvSpPr txBox="1"/>
+          <p:nvPr/>
+        </p:nvSpPr>
+        <p:spPr>
+          <a:xfrm>
+            <a:off x="7157178" y="4254500"/>
+            <a:ext cx="1167884" cy="369332"/>
+          </a:xfrm>
+          <a:prstGeom prst="rect">
+            <a:avLst/>
+          </a:prstGeom>
+          <a:noFill/>
+        </p:spPr>
+        <p:txBody>
+          <a:bodyPr wrap="none" rtlCol="0">
+            <a:spAutoFit/>
+          </a:bodyPr>
+          <a:lstStyle/>
+          <a:p>
+            <a:r>
+              <a:rPr lang="en-DE" dirty="0"/>
+              <a:t>&lt;/guest4&gt;</a:t>
+            </a:r>
+          </a:p>
+        </p:txBody>
+      </p:sp>
+    </p:spTree>
+    <p:extLst>
+      <p:ext uri="{BB962C8B-B14F-4D97-AF65-F5344CB8AC3E}">
+        <p14:creationId xmlns:p14="http://schemas.microsoft.com/office/powerpoint/2010/main" val="3462474979"/>
+      </p:ext>
+    </p:extLst>
+  </p:cSld>
+  <p:clrMapOvr>
+    <a:masterClrMapping/>
+  </p:clrMapOvr>
+</p:sld>
+</file>
+
+<file path=ppt/slides/slide6.xml><?xml version="1.0" encoding="utf-8"?>
+<p:sld xmlns:a="http://schemas.openxmlformats.org/drawingml/2006/main" xmlns:r="http://schemas.openxmlformats.org/officeDocument/2006/relationships" xmlns:p="http://schemas.openxmlformats.org/presentationml/2006/main">
+  <p:cSld>
+    <p:spTree>
+      <p:nvGrpSpPr>
+        <p:cNvPr id="1" name=""/>
+        <p:cNvGrpSpPr/>
+        <p:nvPr/>
+      </p:nvGrpSpPr>
+      <p:grpSpPr>
+        <a:xfrm>
+          <a:off x="0" y="0"/>
+          <a:ext cx="0" cy="0"/>
+          <a:chOff x="0" y="0"/>
+          <a:chExt cx="0" cy="0"/>
+        </a:xfrm>
+      </p:grpSpPr>
+      <p:pic>
+        <p:nvPicPr>
+          <p:cNvPr id="8" name="Graphic 7" descr="User outline">
+            <a:extLst>
+              <a:ext uri="{FF2B5EF4-FFF2-40B4-BE49-F238E27FC236}">
+                <a16:creationId xmlns:a16="http://schemas.microsoft.com/office/drawing/2014/main" id="{8F40C406-7117-2CE9-673D-7D4F13A1122B}"/>
+              </a:ext>
+            </a:extLst>
+          </p:cNvPr>
+          <p:cNvPicPr>
+            <a:picLocks noChangeAspect="1"/>
+          </p:cNvPicPr>
+          <p:nvPr/>
+        </p:nvPicPr>
+        <p:blipFill>
+          <a:blip r:embed="rId2">
+            <a:extLst>
+              <a:ext uri="{96DAC541-7B7A-43D3-8B79-37D633B846F1}">
+                <asvg:svgBlip xmlns:asvg="http://schemas.microsoft.com/office/drawing/2016/SVG/main" r:embed="rId3"/>
+              </a:ext>
+            </a:extLst>
+          </a:blip>
+          <a:stretch>
+            <a:fillRect/>
+          </a:stretch>
+        </p:blipFill>
+        <p:spPr>
+          <a:xfrm>
+            <a:off x="1943100" y="3048000"/>
+            <a:ext cx="1854200" cy="1854200"/>
+          </a:xfrm>
+          <a:prstGeom prst="rect">
+            <a:avLst/>
+          </a:prstGeom>
+        </p:spPr>
+      </p:pic>
+      <p:sp>
+        <p:nvSpPr>
+          <p:cNvPr id="9" name="TextBox 8">
+            <a:extLst>
+              <a:ext uri="{FF2B5EF4-FFF2-40B4-BE49-F238E27FC236}">
+                <a16:creationId xmlns:a16="http://schemas.microsoft.com/office/drawing/2014/main" id="{8324DA46-BFBE-A1BC-0033-E14221BA76A5}"/>
+              </a:ext>
+            </a:extLst>
+          </p:cNvPr>
+          <p:cNvSpPr txBox="1"/>
+          <p:nvPr/>
+        </p:nvSpPr>
+        <p:spPr>
+          <a:xfrm>
+            <a:off x="2318478" y="2678668"/>
+            <a:ext cx="1103444" cy="369332"/>
+          </a:xfrm>
+          <a:prstGeom prst="rect">
+            <a:avLst/>
+          </a:prstGeom>
+          <a:noFill/>
+        </p:spPr>
+        <p:txBody>
+          <a:bodyPr wrap="none" rtlCol="0">
+            <a:spAutoFit/>
+          </a:bodyPr>
+          <a:lstStyle/>
+          <a:p>
+            <a:r>
+              <a:rPr lang="en-DE" dirty="0"/>
+              <a:t>&lt;guest1&gt;</a:t>
+            </a:r>
+          </a:p>
+        </p:txBody>
+      </p:sp>
+      <p:sp>
+        <p:nvSpPr>
+          <p:cNvPr id="10" name="TextBox 9">
+            <a:extLst>
+              <a:ext uri="{FF2B5EF4-FFF2-40B4-BE49-F238E27FC236}">
+                <a16:creationId xmlns:a16="http://schemas.microsoft.com/office/drawing/2014/main" id="{41721BAE-8F22-4679-4C02-C17E7574002F}"/>
+              </a:ext>
+            </a:extLst>
+          </p:cNvPr>
+          <p:cNvSpPr txBox="1"/>
+          <p:nvPr/>
+        </p:nvSpPr>
+        <p:spPr>
+          <a:xfrm>
+            <a:off x="2286258" y="4902200"/>
+            <a:ext cx="1167884" cy="369332"/>
+          </a:xfrm>
+          <a:prstGeom prst="rect">
+            <a:avLst/>
+          </a:prstGeom>
+          <a:noFill/>
+        </p:spPr>
+        <p:txBody>
+          <a:bodyPr wrap="none" rtlCol="0">
+            <a:spAutoFit/>
+          </a:bodyPr>
+          <a:lstStyle/>
+          <a:p>
+            <a:r>
+              <a:rPr lang="en-DE" dirty="0"/>
+              <a:t>&lt;/guest1&gt;</a:t>
+            </a:r>
+          </a:p>
+        </p:txBody>
+      </p:sp>
+      <p:pic>
+        <p:nvPicPr>
+          <p:cNvPr id="12" name="Graphic 11" descr="User outline">
+            <a:extLst>
+              <a:ext uri="{FF2B5EF4-FFF2-40B4-BE49-F238E27FC236}">
+                <a16:creationId xmlns:a16="http://schemas.microsoft.com/office/drawing/2014/main" id="{08536D02-25F1-142F-03C2-2C980AE0A1FC}"/>
+              </a:ext>
+            </a:extLst>
+          </p:cNvPr>
+          <p:cNvPicPr>
+            <a:picLocks noChangeAspect="1"/>
+          </p:cNvPicPr>
+          <p:nvPr/>
+        </p:nvPicPr>
+        <p:blipFill>
+          <a:blip r:embed="rId2">
+            <a:extLst>
+              <a:ext uri="{96DAC541-7B7A-43D3-8B79-37D633B846F1}">
+                <asvg:svgBlip xmlns:asvg="http://schemas.microsoft.com/office/drawing/2016/SVG/main" r:embed="rId3"/>
+              </a:ext>
+            </a:extLst>
+          </a:blip>
+          <a:stretch>
+            <a:fillRect/>
+          </a:stretch>
+        </p:blipFill>
+        <p:spPr>
+          <a:xfrm>
+            <a:off x="3829520" y="3048000"/>
+            <a:ext cx="1854200" cy="1854200"/>
+          </a:xfrm>
+          <a:prstGeom prst="rect">
+            <a:avLst/>
+          </a:prstGeom>
+        </p:spPr>
+      </p:pic>
+      <p:sp>
+        <p:nvSpPr>
+          <p:cNvPr id="13" name="TextBox 12">
+            <a:extLst>
+              <a:ext uri="{FF2B5EF4-FFF2-40B4-BE49-F238E27FC236}">
+                <a16:creationId xmlns:a16="http://schemas.microsoft.com/office/drawing/2014/main" id="{1E03F521-DFA7-D806-11B2-F3B05406C14B}"/>
+              </a:ext>
+            </a:extLst>
+          </p:cNvPr>
+          <p:cNvSpPr txBox="1"/>
+          <p:nvPr/>
+        </p:nvSpPr>
+        <p:spPr>
+          <a:xfrm>
+            <a:off x="4204898" y="2678668"/>
+            <a:ext cx="1103444" cy="369332"/>
+          </a:xfrm>
+          <a:prstGeom prst="rect">
+            <a:avLst/>
+          </a:prstGeom>
+          <a:noFill/>
+        </p:spPr>
+        <p:txBody>
+          <a:bodyPr wrap="none" rtlCol="0">
+            <a:spAutoFit/>
+          </a:bodyPr>
+          <a:lstStyle/>
+          <a:p>
+            <a:r>
+              <a:rPr lang="en-DE" dirty="0"/>
+              <a:t>&lt;guest2&gt;</a:t>
+            </a:r>
+          </a:p>
+        </p:txBody>
+      </p:sp>
+      <p:sp>
+        <p:nvSpPr>
+          <p:cNvPr id="14" name="TextBox 13">
+            <a:extLst>
+              <a:ext uri="{FF2B5EF4-FFF2-40B4-BE49-F238E27FC236}">
+                <a16:creationId xmlns:a16="http://schemas.microsoft.com/office/drawing/2014/main" id="{B4395035-97E5-008D-09BF-7412FF2A828C}"/>
+              </a:ext>
+            </a:extLst>
+          </p:cNvPr>
+          <p:cNvSpPr txBox="1"/>
+          <p:nvPr/>
+        </p:nvSpPr>
+        <p:spPr>
+          <a:xfrm>
+            <a:off x="4172678" y="4902200"/>
+            <a:ext cx="1167884" cy="369332"/>
+          </a:xfrm>
+          <a:prstGeom prst="rect">
+            <a:avLst/>
+          </a:prstGeom>
+          <a:noFill/>
+        </p:spPr>
+        <p:txBody>
+          <a:bodyPr wrap="none" rtlCol="0">
+            <a:spAutoFit/>
+          </a:bodyPr>
+          <a:lstStyle/>
+          <a:p>
+            <a:r>
+              <a:rPr lang="en-DE" dirty="0"/>
+              <a:t>&lt;/guest2&gt;</a:t>
+            </a:r>
+          </a:p>
+        </p:txBody>
+      </p:sp>
+      <p:pic>
+        <p:nvPicPr>
+          <p:cNvPr id="15" name="Graphic 14" descr="User outline">
+            <a:extLst>
+              <a:ext uri="{FF2B5EF4-FFF2-40B4-BE49-F238E27FC236}">
+                <a16:creationId xmlns:a16="http://schemas.microsoft.com/office/drawing/2014/main" id="{E2C80FE1-2EED-CA91-DFEA-4CF15A0E3A79}"/>
+              </a:ext>
+            </a:extLst>
+          </p:cNvPr>
+          <p:cNvPicPr>
+            <a:picLocks noChangeAspect="1"/>
+          </p:cNvPicPr>
+          <p:nvPr/>
+        </p:nvPicPr>
+        <p:blipFill>
+          <a:blip r:embed="rId2">
+            <a:extLst>
+              <a:ext uri="{96DAC541-7B7A-43D3-8B79-37D633B846F1}">
+                <asvg:svgBlip xmlns:asvg="http://schemas.microsoft.com/office/drawing/2016/SVG/main" r:embed="rId3"/>
+              </a:ext>
+            </a:extLst>
+          </a:blip>
+          <a:stretch>
+            <a:fillRect/>
+          </a:stretch>
+        </p:blipFill>
+        <p:spPr>
+          <a:xfrm>
+            <a:off x="5683720" y="3048000"/>
+            <a:ext cx="1854200" cy="1854200"/>
+          </a:xfrm>
+          <a:prstGeom prst="rect">
+            <a:avLst/>
+          </a:prstGeom>
+        </p:spPr>
+      </p:pic>
+      <p:sp>
+        <p:nvSpPr>
+          <p:cNvPr id="17" name="TextBox 16">
+            <a:extLst>
+              <a:ext uri="{FF2B5EF4-FFF2-40B4-BE49-F238E27FC236}">
+                <a16:creationId xmlns:a16="http://schemas.microsoft.com/office/drawing/2014/main" id="{49C9E987-FC80-DF73-1916-3D57009995F9}"/>
+              </a:ext>
+            </a:extLst>
+          </p:cNvPr>
+          <p:cNvSpPr txBox="1"/>
+          <p:nvPr/>
+        </p:nvSpPr>
+        <p:spPr>
+          <a:xfrm>
+            <a:off x="6059098" y="2678668"/>
+            <a:ext cx="1103444" cy="369332"/>
+          </a:xfrm>
+          <a:prstGeom prst="rect">
+            <a:avLst/>
+          </a:prstGeom>
+          <a:noFill/>
+        </p:spPr>
+        <p:txBody>
+          <a:bodyPr wrap="none" rtlCol="0">
+            <a:spAutoFit/>
+          </a:bodyPr>
+          <a:lstStyle/>
+          <a:p>
+            <a:r>
+              <a:rPr lang="en-DE" dirty="0"/>
+              <a:t>&lt;guest3&gt;</a:t>
+            </a:r>
+          </a:p>
+        </p:txBody>
+      </p:sp>
+      <p:sp>
+        <p:nvSpPr>
+          <p:cNvPr id="18" name="TextBox 17">
+            <a:extLst>
+              <a:ext uri="{FF2B5EF4-FFF2-40B4-BE49-F238E27FC236}">
+                <a16:creationId xmlns:a16="http://schemas.microsoft.com/office/drawing/2014/main" id="{9726113D-1839-73A0-04EE-8BE6DB8C25A3}"/>
+              </a:ext>
+            </a:extLst>
+          </p:cNvPr>
+          <p:cNvSpPr txBox="1"/>
+          <p:nvPr/>
+        </p:nvSpPr>
+        <p:spPr>
+          <a:xfrm>
+            <a:off x="6026878" y="4902200"/>
+            <a:ext cx="1167884" cy="369332"/>
+          </a:xfrm>
+          <a:prstGeom prst="rect">
+            <a:avLst/>
+          </a:prstGeom>
+          <a:noFill/>
+        </p:spPr>
+        <p:txBody>
+          <a:bodyPr wrap="none" rtlCol="0">
+            <a:spAutoFit/>
+          </a:bodyPr>
+          <a:lstStyle/>
+          <a:p>
+            <a:r>
+              <a:rPr lang="en-DE" dirty="0"/>
+              <a:t>&lt;/guest3&gt;</a:t>
+            </a:r>
+          </a:p>
+        </p:txBody>
+      </p:sp>
+      <p:pic>
+        <p:nvPicPr>
+          <p:cNvPr id="23" name="Graphic 22" descr="User outline">
+            <a:extLst>
+              <a:ext uri="{FF2B5EF4-FFF2-40B4-BE49-F238E27FC236}">
+                <a16:creationId xmlns:a16="http://schemas.microsoft.com/office/drawing/2014/main" id="{266127ED-2C8B-55F5-9335-A313A7ECD0DC}"/>
+              </a:ext>
+            </a:extLst>
+          </p:cNvPr>
+          <p:cNvPicPr>
+            <a:picLocks noChangeAspect="1"/>
+          </p:cNvPicPr>
+          <p:nvPr/>
+        </p:nvPicPr>
+        <p:blipFill>
+          <a:blip r:embed="rId2">
+            <a:extLst>
+              <a:ext uri="{96DAC541-7B7A-43D3-8B79-37D633B846F1}">
+                <asvg:svgBlip xmlns:asvg="http://schemas.microsoft.com/office/drawing/2016/SVG/main" r:embed="rId3"/>
+              </a:ext>
+            </a:extLst>
+          </a:blip>
+          <a:stretch>
+            <a:fillRect/>
+          </a:stretch>
+        </p:blipFill>
+        <p:spPr>
+          <a:xfrm>
+            <a:off x="7537920" y="3048000"/>
+            <a:ext cx="1854200" cy="1854200"/>
+          </a:xfrm>
+          <a:prstGeom prst="rect">
+            <a:avLst/>
+          </a:prstGeom>
+        </p:spPr>
+      </p:pic>
+      <p:sp>
+        <p:nvSpPr>
+          <p:cNvPr id="24" name="TextBox 23">
+            <a:extLst>
+              <a:ext uri="{FF2B5EF4-FFF2-40B4-BE49-F238E27FC236}">
+                <a16:creationId xmlns:a16="http://schemas.microsoft.com/office/drawing/2014/main" id="{069AF07C-9D51-EAC5-0337-4A40416AC950}"/>
+              </a:ext>
+            </a:extLst>
+          </p:cNvPr>
+          <p:cNvSpPr txBox="1"/>
+          <p:nvPr/>
+        </p:nvSpPr>
+        <p:spPr>
+          <a:xfrm>
+            <a:off x="7913298" y="2678668"/>
+            <a:ext cx="1103444" cy="369332"/>
+          </a:xfrm>
+          <a:prstGeom prst="rect">
+            <a:avLst/>
+          </a:prstGeom>
+          <a:noFill/>
+        </p:spPr>
+        <p:txBody>
+          <a:bodyPr wrap="none" rtlCol="0">
+            <a:spAutoFit/>
+          </a:bodyPr>
+          <a:lstStyle/>
+          <a:p>
+            <a:r>
+              <a:rPr lang="en-DE" dirty="0"/>
+              <a:t>&lt;guest4&gt;</a:t>
+            </a:r>
+          </a:p>
+        </p:txBody>
+      </p:sp>
+      <p:sp>
+        <p:nvSpPr>
+          <p:cNvPr id="25" name="TextBox 24">
+            <a:extLst>
+              <a:ext uri="{FF2B5EF4-FFF2-40B4-BE49-F238E27FC236}">
+                <a16:creationId xmlns:a16="http://schemas.microsoft.com/office/drawing/2014/main" id="{ADE39639-36BA-A61C-700D-B5BC921F12A8}"/>
+              </a:ext>
+            </a:extLst>
+          </p:cNvPr>
+          <p:cNvSpPr txBox="1"/>
+          <p:nvPr/>
+        </p:nvSpPr>
+        <p:spPr>
+          <a:xfrm>
+            <a:off x="7881078" y="4902200"/>
+            <a:ext cx="1167884" cy="369332"/>
+          </a:xfrm>
+          <a:prstGeom prst="rect">
+            <a:avLst/>
+          </a:prstGeom>
+          <a:noFill/>
+        </p:spPr>
+        <p:txBody>
+          <a:bodyPr wrap="none" rtlCol="0">
+            <a:spAutoFit/>
+          </a:bodyPr>
+          <a:lstStyle/>
+          <a:p>
+            <a:r>
+              <a:rPr lang="en-DE" dirty="0"/>
+              <a:t>&lt;/guest4&gt;</a:t>
+            </a:r>
+          </a:p>
+        </p:txBody>
+      </p:sp>
+      <p:sp>
+        <p:nvSpPr>
+          <p:cNvPr id="4" name="TextBox 3">
+            <a:extLst>
+              <a:ext uri="{FF2B5EF4-FFF2-40B4-BE49-F238E27FC236}">
+                <a16:creationId xmlns:a16="http://schemas.microsoft.com/office/drawing/2014/main" id="{EE2AF03F-2397-C4A7-29C7-63BAB324950E}"/>
+              </a:ext>
+            </a:extLst>
+          </p:cNvPr>
+          <p:cNvSpPr txBox="1"/>
+          <p:nvPr/>
+        </p:nvSpPr>
+        <p:spPr>
+          <a:xfrm>
+            <a:off x="5131998" y="1983938"/>
+            <a:ext cx="1063817" cy="369332"/>
+          </a:xfrm>
+          <a:prstGeom prst="rect">
+            <a:avLst/>
+          </a:prstGeom>
+          <a:noFill/>
+        </p:spPr>
+        <p:txBody>
+          <a:bodyPr wrap="none" rtlCol="0">
+            <a:spAutoFit/>
+          </a:bodyPr>
+          <a:lstStyle/>
+          <a:p>
+            <a:r>
+              <a:rPr lang="en-DE" dirty="0"/>
+              <a:t>&lt;table1&gt;</a:t>
+            </a:r>
+          </a:p>
+        </p:txBody>
+      </p:sp>
+      <p:sp>
+        <p:nvSpPr>
+          <p:cNvPr id="5" name="TextBox 4">
+            <a:extLst>
+              <a:ext uri="{FF2B5EF4-FFF2-40B4-BE49-F238E27FC236}">
+                <a16:creationId xmlns:a16="http://schemas.microsoft.com/office/drawing/2014/main" id="{4DFBD993-DB6F-F26C-6BF1-FBE8CCA77654}"/>
+              </a:ext>
+            </a:extLst>
+          </p:cNvPr>
+          <p:cNvSpPr txBox="1"/>
+          <p:nvPr/>
+        </p:nvSpPr>
+        <p:spPr>
+          <a:xfrm>
+            <a:off x="5131998" y="5596930"/>
+            <a:ext cx="1138325" cy="369332"/>
+          </a:xfrm>
+          <a:prstGeom prst="rect">
+            <a:avLst/>
+          </a:prstGeom>
+          <a:noFill/>
+        </p:spPr>
+        <p:txBody>
+          <a:bodyPr wrap="none" rtlCol="0">
+            <a:spAutoFit/>
+          </a:bodyPr>
+          <a:lstStyle/>
+          <a:p>
+            <a:r>
+              <a:rPr lang="en-DE" dirty="0"/>
+              <a:t>&lt;/table1&gt;</a:t>
+            </a:r>
+          </a:p>
+        </p:txBody>
+      </p:sp>
+    </p:spTree>
+    <p:extLst>
+      <p:ext uri="{BB962C8B-B14F-4D97-AF65-F5344CB8AC3E}">
+        <p14:creationId xmlns:p14="http://schemas.microsoft.com/office/powerpoint/2010/main" val="1391469996"/>
+      </p:ext>
+    </p:extLst>
+  </p:cSld>
+  <p:clrMapOvr>
+    <a:masterClrMapping/>
+  </p:clrMapOvr>
+</p:sld>
+</file>
+
+<file path=ppt/slides/slide7.xml><?xml version="1.0" encoding="utf-8"?>
+<p:sld xmlns:a="http://schemas.openxmlformats.org/drawingml/2006/main" xmlns:r="http://schemas.openxmlformats.org/officeDocument/2006/relationships" xmlns:p="http://schemas.openxmlformats.org/presentationml/2006/main">
+  <p:cSld>
+    <p:spTree>
+      <p:nvGrpSpPr>
+        <p:cNvPr id="1" name=""/>
+        <p:cNvGrpSpPr/>
+        <p:nvPr/>
+      </p:nvGrpSpPr>
+      <p:grpSpPr>
+        <a:xfrm>
+          <a:off x="0" y="0"/>
+          <a:ext cx="0" cy="0"/>
+          <a:chOff x="0" y="0"/>
+          <a:chExt cx="0" cy="0"/>
+        </a:xfrm>
+      </p:grpSpPr>
       <p:sp>
         <p:nvSpPr>
           <p:cNvPr id="2" name="Rectangle 1">
@@ -11319,6 +12300,1081 @@
     <p:extLst>
       <p:ext uri="{BB962C8B-B14F-4D97-AF65-F5344CB8AC3E}">
         <p14:creationId xmlns:p14="http://schemas.microsoft.com/office/powerpoint/2010/main" val="1848432832"/>
+      </p:ext>
+    </p:extLst>
+  </p:cSld>
+  <p:clrMapOvr>
+    <a:masterClrMapping/>
+  </p:clrMapOvr>
+</p:sld>
+</file>
+
+<file path=ppt/slides/slide8.xml><?xml version="1.0" encoding="utf-8"?>
+<p:sld xmlns:a="http://schemas.openxmlformats.org/drawingml/2006/main" xmlns:r="http://schemas.openxmlformats.org/officeDocument/2006/relationships" xmlns:p="http://schemas.openxmlformats.org/presentationml/2006/main">
+  <p:cSld>
+    <p:spTree>
+      <p:nvGrpSpPr>
+        <p:cNvPr id="1" name=""/>
+        <p:cNvGrpSpPr/>
+        <p:nvPr/>
+      </p:nvGrpSpPr>
+      <p:grpSpPr>
+        <a:xfrm>
+          <a:off x="0" y="0"/>
+          <a:ext cx="0" cy="0"/>
+          <a:chOff x="0" y="0"/>
+          <a:chExt cx="0" cy="0"/>
+        </a:xfrm>
+      </p:grpSpPr>
+      <p:sp>
+        <p:nvSpPr>
+          <p:cNvPr id="3" name="Rounded Rectangle 2">
+            <a:extLst>
+              <a:ext uri="{FF2B5EF4-FFF2-40B4-BE49-F238E27FC236}">
+                <a16:creationId xmlns:a16="http://schemas.microsoft.com/office/drawing/2014/main" id="{AEB38640-EC95-7EA3-80A6-CBA4E6953B48}"/>
+              </a:ext>
+            </a:extLst>
+          </p:cNvPr>
+          <p:cNvSpPr/>
+          <p:nvPr/>
+        </p:nvSpPr>
+        <p:spPr>
+          <a:xfrm>
+            <a:off x="101600" y="2827721"/>
+            <a:ext cx="2564525" cy="1240220"/>
+          </a:xfrm>
+          <a:prstGeom prst="roundRect">
+            <a:avLst/>
+          </a:prstGeom>
+          <a:noFill/>
+          <a:ln>
+            <a:extLst>
+              <a:ext uri="{C807C97D-BFC1-408E-A445-0C87EB9F89A2}">
+                <ask:lineSketchStyleProps xmlns:ask="http://schemas.microsoft.com/office/drawing/2018/sketchyshapes" sd="1219033472">
+                  <a:custGeom>
+                    <a:avLst/>
+                    <a:gdLst>
+                      <a:gd name="connsiteX0" fmla="*/ 0 w 2564525"/>
+                      <a:gd name="connsiteY0" fmla="*/ 206707 h 1240220"/>
+                      <a:gd name="connsiteX1" fmla="*/ 206707 w 2564525"/>
+                      <a:gd name="connsiteY1" fmla="*/ 0 h 1240220"/>
+                      <a:gd name="connsiteX2" fmla="*/ 2357818 w 2564525"/>
+                      <a:gd name="connsiteY2" fmla="*/ 0 h 1240220"/>
+                      <a:gd name="connsiteX3" fmla="*/ 2564525 w 2564525"/>
+                      <a:gd name="connsiteY3" fmla="*/ 206707 h 1240220"/>
+                      <a:gd name="connsiteX4" fmla="*/ 2564525 w 2564525"/>
+                      <a:gd name="connsiteY4" fmla="*/ 1033513 h 1240220"/>
+                      <a:gd name="connsiteX5" fmla="*/ 2357818 w 2564525"/>
+                      <a:gd name="connsiteY5" fmla="*/ 1240220 h 1240220"/>
+                      <a:gd name="connsiteX6" fmla="*/ 206707 w 2564525"/>
+                      <a:gd name="connsiteY6" fmla="*/ 1240220 h 1240220"/>
+                      <a:gd name="connsiteX7" fmla="*/ 0 w 2564525"/>
+                      <a:gd name="connsiteY7" fmla="*/ 1033513 h 1240220"/>
+                      <a:gd name="connsiteX8" fmla="*/ 0 w 2564525"/>
+                      <a:gd name="connsiteY8" fmla="*/ 206707 h 1240220"/>
+                    </a:gdLst>
+                    <a:ahLst/>
+                    <a:cxnLst>
+                      <a:cxn ang="0">
+                        <a:pos x="connsiteX0" y="connsiteY0"/>
+                      </a:cxn>
+                      <a:cxn ang="0">
+                        <a:pos x="connsiteX1" y="connsiteY1"/>
+                      </a:cxn>
+                      <a:cxn ang="0">
+                        <a:pos x="connsiteX2" y="connsiteY2"/>
+                      </a:cxn>
+                      <a:cxn ang="0">
+                        <a:pos x="connsiteX3" y="connsiteY3"/>
+                      </a:cxn>
+                      <a:cxn ang="0">
+                        <a:pos x="connsiteX4" y="connsiteY4"/>
+                      </a:cxn>
+                      <a:cxn ang="0">
+                        <a:pos x="connsiteX5" y="connsiteY5"/>
+                      </a:cxn>
+                      <a:cxn ang="0">
+                        <a:pos x="connsiteX6" y="connsiteY6"/>
+                      </a:cxn>
+                      <a:cxn ang="0">
+                        <a:pos x="connsiteX7" y="connsiteY7"/>
+                      </a:cxn>
+                      <a:cxn ang="0">
+                        <a:pos x="connsiteX8" y="connsiteY8"/>
+                      </a:cxn>
+                    </a:cxnLst>
+                    <a:rect l="l" t="t" r="r" b="b"/>
+                    <a:pathLst>
+                      <a:path w="2564525" h="1240220" extrusionOk="0">
+                        <a:moveTo>
+                          <a:pt x="0" y="206707"/>
+                        </a:moveTo>
+                        <a:cubicBezTo>
+                          <a:pt x="-5200" y="89339"/>
+                          <a:pt x="80750" y="4427"/>
+                          <a:pt x="206707" y="0"/>
+                        </a:cubicBezTo>
+                        <a:cubicBezTo>
+                          <a:pt x="775030" y="132882"/>
+                          <a:pt x="1288917" y="-84951"/>
+                          <a:pt x="2357818" y="0"/>
+                        </a:cubicBezTo>
+                        <a:cubicBezTo>
+                          <a:pt x="2458816" y="12855"/>
+                          <a:pt x="2561166" y="111110"/>
+                          <a:pt x="2564525" y="206707"/>
+                        </a:cubicBezTo>
+                        <a:cubicBezTo>
+                          <a:pt x="2515705" y="302109"/>
+                          <a:pt x="2499116" y="713918"/>
+                          <a:pt x="2564525" y="1033513"/>
+                        </a:cubicBezTo>
+                        <a:cubicBezTo>
+                          <a:pt x="2570313" y="1148361"/>
+                          <a:pt x="2477593" y="1228667"/>
+                          <a:pt x="2357818" y="1240220"/>
+                        </a:cubicBezTo>
+                        <a:cubicBezTo>
+                          <a:pt x="1367440" y="1327859"/>
+                          <a:pt x="894978" y="1167541"/>
+                          <a:pt x="206707" y="1240220"/>
+                        </a:cubicBezTo>
+                        <a:cubicBezTo>
+                          <a:pt x="91495" y="1230195"/>
+                          <a:pt x="-12916" y="1165624"/>
+                          <a:pt x="0" y="1033513"/>
+                        </a:cubicBezTo>
+                        <a:cubicBezTo>
+                          <a:pt x="-6605" y="803162"/>
+                          <a:pt x="-2922" y="504459"/>
+                          <a:pt x="0" y="206707"/>
+                        </a:cubicBezTo>
+                        <a:close/>
+                      </a:path>
+                    </a:pathLst>
+                  </a:custGeom>
+                  <ask:type>
+                    <ask:lineSketchNone/>
+                  </ask:type>
+                </ask:lineSketchStyleProps>
+              </a:ext>
+            </a:extLst>
+          </a:ln>
+        </p:spPr>
+        <p:style>
+          <a:lnRef idx="2">
+            <a:schemeClr val="accent1">
+              <a:shade val="15000"/>
+            </a:schemeClr>
+          </a:lnRef>
+          <a:fillRef idx="1">
+            <a:schemeClr val="accent1"/>
+          </a:fillRef>
+          <a:effectRef idx="0">
+            <a:schemeClr val="accent1"/>
+          </a:effectRef>
+          <a:fontRef idx="minor">
+            <a:schemeClr val="lt1"/>
+          </a:fontRef>
+        </p:style>
+        <p:txBody>
+          <a:bodyPr rtlCol="0" anchor="ctr"/>
+          <a:lstStyle/>
+          <a:p>
+            <a:pPr algn="ctr"/>
+            <a:r>
+              <a:rPr lang="en-DE" dirty="0">
+                <a:solidFill>
+                  <a:schemeClr val="tx1"/>
+                </a:solidFill>
+              </a:rPr>
+              <a:t>Text Embedding</a:t>
+            </a:r>
+          </a:p>
+        </p:txBody>
+      </p:sp>
+      <p:sp>
+        <p:nvSpPr>
+          <p:cNvPr id="4" name="Rounded Rectangle 3">
+            <a:extLst>
+              <a:ext uri="{FF2B5EF4-FFF2-40B4-BE49-F238E27FC236}">
+                <a16:creationId xmlns:a16="http://schemas.microsoft.com/office/drawing/2014/main" id="{FF0CB348-848D-F1D0-48C6-5D6764AF9521}"/>
+              </a:ext>
+            </a:extLst>
+          </p:cNvPr>
+          <p:cNvSpPr/>
+          <p:nvPr/>
+        </p:nvSpPr>
+        <p:spPr>
+          <a:xfrm>
+            <a:off x="3226675" y="1947480"/>
+            <a:ext cx="2564525" cy="1240220"/>
+          </a:xfrm>
+          <a:prstGeom prst="roundRect">
+            <a:avLst/>
+          </a:prstGeom>
+          <a:noFill/>
+          <a:ln>
+            <a:extLst>
+              <a:ext uri="{C807C97D-BFC1-408E-A445-0C87EB9F89A2}">
+                <ask:lineSketchStyleProps xmlns:ask="http://schemas.microsoft.com/office/drawing/2018/sketchyshapes" sd="1219033472">
+                  <a:custGeom>
+                    <a:avLst/>
+                    <a:gdLst>
+                      <a:gd name="connsiteX0" fmla="*/ 0 w 2564525"/>
+                      <a:gd name="connsiteY0" fmla="*/ 206707 h 1240220"/>
+                      <a:gd name="connsiteX1" fmla="*/ 206707 w 2564525"/>
+                      <a:gd name="connsiteY1" fmla="*/ 0 h 1240220"/>
+                      <a:gd name="connsiteX2" fmla="*/ 2357818 w 2564525"/>
+                      <a:gd name="connsiteY2" fmla="*/ 0 h 1240220"/>
+                      <a:gd name="connsiteX3" fmla="*/ 2564525 w 2564525"/>
+                      <a:gd name="connsiteY3" fmla="*/ 206707 h 1240220"/>
+                      <a:gd name="connsiteX4" fmla="*/ 2564525 w 2564525"/>
+                      <a:gd name="connsiteY4" fmla="*/ 1033513 h 1240220"/>
+                      <a:gd name="connsiteX5" fmla="*/ 2357818 w 2564525"/>
+                      <a:gd name="connsiteY5" fmla="*/ 1240220 h 1240220"/>
+                      <a:gd name="connsiteX6" fmla="*/ 206707 w 2564525"/>
+                      <a:gd name="connsiteY6" fmla="*/ 1240220 h 1240220"/>
+                      <a:gd name="connsiteX7" fmla="*/ 0 w 2564525"/>
+                      <a:gd name="connsiteY7" fmla="*/ 1033513 h 1240220"/>
+                      <a:gd name="connsiteX8" fmla="*/ 0 w 2564525"/>
+                      <a:gd name="connsiteY8" fmla="*/ 206707 h 1240220"/>
+                    </a:gdLst>
+                    <a:ahLst/>
+                    <a:cxnLst>
+                      <a:cxn ang="0">
+                        <a:pos x="connsiteX0" y="connsiteY0"/>
+                      </a:cxn>
+                      <a:cxn ang="0">
+                        <a:pos x="connsiteX1" y="connsiteY1"/>
+                      </a:cxn>
+                      <a:cxn ang="0">
+                        <a:pos x="connsiteX2" y="connsiteY2"/>
+                      </a:cxn>
+                      <a:cxn ang="0">
+                        <a:pos x="connsiteX3" y="connsiteY3"/>
+                      </a:cxn>
+                      <a:cxn ang="0">
+                        <a:pos x="connsiteX4" y="connsiteY4"/>
+                      </a:cxn>
+                      <a:cxn ang="0">
+                        <a:pos x="connsiteX5" y="connsiteY5"/>
+                      </a:cxn>
+                      <a:cxn ang="0">
+                        <a:pos x="connsiteX6" y="connsiteY6"/>
+                      </a:cxn>
+                      <a:cxn ang="0">
+                        <a:pos x="connsiteX7" y="connsiteY7"/>
+                      </a:cxn>
+                      <a:cxn ang="0">
+                        <a:pos x="connsiteX8" y="connsiteY8"/>
+                      </a:cxn>
+                    </a:cxnLst>
+                    <a:rect l="l" t="t" r="r" b="b"/>
+                    <a:pathLst>
+                      <a:path w="2564525" h="1240220" extrusionOk="0">
+                        <a:moveTo>
+                          <a:pt x="0" y="206707"/>
+                        </a:moveTo>
+                        <a:cubicBezTo>
+                          <a:pt x="-5200" y="89339"/>
+                          <a:pt x="80750" y="4427"/>
+                          <a:pt x="206707" y="0"/>
+                        </a:cubicBezTo>
+                        <a:cubicBezTo>
+                          <a:pt x="775030" y="132882"/>
+                          <a:pt x="1288917" y="-84951"/>
+                          <a:pt x="2357818" y="0"/>
+                        </a:cubicBezTo>
+                        <a:cubicBezTo>
+                          <a:pt x="2458816" y="12855"/>
+                          <a:pt x="2561166" y="111110"/>
+                          <a:pt x="2564525" y="206707"/>
+                        </a:cubicBezTo>
+                        <a:cubicBezTo>
+                          <a:pt x="2515705" y="302109"/>
+                          <a:pt x="2499116" y="713918"/>
+                          <a:pt x="2564525" y="1033513"/>
+                        </a:cubicBezTo>
+                        <a:cubicBezTo>
+                          <a:pt x="2570313" y="1148361"/>
+                          <a:pt x="2477593" y="1228667"/>
+                          <a:pt x="2357818" y="1240220"/>
+                        </a:cubicBezTo>
+                        <a:cubicBezTo>
+                          <a:pt x="1367440" y="1327859"/>
+                          <a:pt x="894978" y="1167541"/>
+                          <a:pt x="206707" y="1240220"/>
+                        </a:cubicBezTo>
+                        <a:cubicBezTo>
+                          <a:pt x="91495" y="1230195"/>
+                          <a:pt x="-12916" y="1165624"/>
+                          <a:pt x="0" y="1033513"/>
+                        </a:cubicBezTo>
+                        <a:cubicBezTo>
+                          <a:pt x="-6605" y="803162"/>
+                          <a:pt x="-2922" y="504459"/>
+                          <a:pt x="0" y="206707"/>
+                        </a:cubicBezTo>
+                        <a:close/>
+                      </a:path>
+                    </a:pathLst>
+                  </a:custGeom>
+                  <ask:type>
+                    <ask:lineSketchNone/>
+                  </ask:type>
+                </ask:lineSketchStyleProps>
+              </a:ext>
+            </a:extLst>
+          </a:ln>
+        </p:spPr>
+        <p:style>
+          <a:lnRef idx="2">
+            <a:schemeClr val="accent1">
+              <a:shade val="15000"/>
+            </a:schemeClr>
+          </a:lnRef>
+          <a:fillRef idx="1">
+            <a:schemeClr val="accent1"/>
+          </a:fillRef>
+          <a:effectRef idx="0">
+            <a:schemeClr val="accent1"/>
+          </a:effectRef>
+          <a:fontRef idx="minor">
+            <a:schemeClr val="lt1"/>
+          </a:fontRef>
+        </p:style>
+        <p:txBody>
+          <a:bodyPr rtlCol="0" anchor="ctr"/>
+          <a:lstStyle/>
+          <a:p>
+            <a:pPr algn="ctr"/>
+            <a:r>
+              <a:rPr lang="en-DE" dirty="0">
+                <a:solidFill>
+                  <a:schemeClr val="tx1"/>
+                </a:solidFill>
+              </a:rPr>
+              <a:t>FAISS Vector Index</a:t>
+            </a:r>
+          </a:p>
+        </p:txBody>
+      </p:sp>
+      <p:sp>
+        <p:nvSpPr>
+          <p:cNvPr id="5" name="Rounded Rectangle 4">
+            <a:extLst>
+              <a:ext uri="{FF2B5EF4-FFF2-40B4-BE49-F238E27FC236}">
+                <a16:creationId xmlns:a16="http://schemas.microsoft.com/office/drawing/2014/main" id="{415601E1-6D38-4693-9E1D-371D1AA04049}"/>
+              </a:ext>
+            </a:extLst>
+          </p:cNvPr>
+          <p:cNvSpPr/>
+          <p:nvPr/>
+        </p:nvSpPr>
+        <p:spPr>
+          <a:xfrm>
+            <a:off x="3226675" y="3776280"/>
+            <a:ext cx="2564525" cy="1240220"/>
+          </a:xfrm>
+          <a:prstGeom prst="roundRect">
+            <a:avLst/>
+          </a:prstGeom>
+          <a:noFill/>
+          <a:ln>
+            <a:extLst>
+              <a:ext uri="{C807C97D-BFC1-408E-A445-0C87EB9F89A2}">
+                <ask:lineSketchStyleProps xmlns:ask="http://schemas.microsoft.com/office/drawing/2018/sketchyshapes" sd="1219033472">
+                  <a:custGeom>
+                    <a:avLst/>
+                    <a:gdLst>
+                      <a:gd name="connsiteX0" fmla="*/ 0 w 2564525"/>
+                      <a:gd name="connsiteY0" fmla="*/ 206707 h 1240220"/>
+                      <a:gd name="connsiteX1" fmla="*/ 206707 w 2564525"/>
+                      <a:gd name="connsiteY1" fmla="*/ 0 h 1240220"/>
+                      <a:gd name="connsiteX2" fmla="*/ 2357818 w 2564525"/>
+                      <a:gd name="connsiteY2" fmla="*/ 0 h 1240220"/>
+                      <a:gd name="connsiteX3" fmla="*/ 2564525 w 2564525"/>
+                      <a:gd name="connsiteY3" fmla="*/ 206707 h 1240220"/>
+                      <a:gd name="connsiteX4" fmla="*/ 2564525 w 2564525"/>
+                      <a:gd name="connsiteY4" fmla="*/ 1033513 h 1240220"/>
+                      <a:gd name="connsiteX5" fmla="*/ 2357818 w 2564525"/>
+                      <a:gd name="connsiteY5" fmla="*/ 1240220 h 1240220"/>
+                      <a:gd name="connsiteX6" fmla="*/ 206707 w 2564525"/>
+                      <a:gd name="connsiteY6" fmla="*/ 1240220 h 1240220"/>
+                      <a:gd name="connsiteX7" fmla="*/ 0 w 2564525"/>
+                      <a:gd name="connsiteY7" fmla="*/ 1033513 h 1240220"/>
+                      <a:gd name="connsiteX8" fmla="*/ 0 w 2564525"/>
+                      <a:gd name="connsiteY8" fmla="*/ 206707 h 1240220"/>
+                    </a:gdLst>
+                    <a:ahLst/>
+                    <a:cxnLst>
+                      <a:cxn ang="0">
+                        <a:pos x="connsiteX0" y="connsiteY0"/>
+                      </a:cxn>
+                      <a:cxn ang="0">
+                        <a:pos x="connsiteX1" y="connsiteY1"/>
+                      </a:cxn>
+                      <a:cxn ang="0">
+                        <a:pos x="connsiteX2" y="connsiteY2"/>
+                      </a:cxn>
+                      <a:cxn ang="0">
+                        <a:pos x="connsiteX3" y="connsiteY3"/>
+                      </a:cxn>
+                      <a:cxn ang="0">
+                        <a:pos x="connsiteX4" y="connsiteY4"/>
+                      </a:cxn>
+                      <a:cxn ang="0">
+                        <a:pos x="connsiteX5" y="connsiteY5"/>
+                      </a:cxn>
+                      <a:cxn ang="0">
+                        <a:pos x="connsiteX6" y="connsiteY6"/>
+                      </a:cxn>
+                      <a:cxn ang="0">
+                        <a:pos x="connsiteX7" y="connsiteY7"/>
+                      </a:cxn>
+                      <a:cxn ang="0">
+                        <a:pos x="connsiteX8" y="connsiteY8"/>
+                      </a:cxn>
+                    </a:cxnLst>
+                    <a:rect l="l" t="t" r="r" b="b"/>
+                    <a:pathLst>
+                      <a:path w="2564525" h="1240220" extrusionOk="0">
+                        <a:moveTo>
+                          <a:pt x="0" y="206707"/>
+                        </a:moveTo>
+                        <a:cubicBezTo>
+                          <a:pt x="-5200" y="89339"/>
+                          <a:pt x="80750" y="4427"/>
+                          <a:pt x="206707" y="0"/>
+                        </a:cubicBezTo>
+                        <a:cubicBezTo>
+                          <a:pt x="775030" y="132882"/>
+                          <a:pt x="1288917" y="-84951"/>
+                          <a:pt x="2357818" y="0"/>
+                        </a:cubicBezTo>
+                        <a:cubicBezTo>
+                          <a:pt x="2458816" y="12855"/>
+                          <a:pt x="2561166" y="111110"/>
+                          <a:pt x="2564525" y="206707"/>
+                        </a:cubicBezTo>
+                        <a:cubicBezTo>
+                          <a:pt x="2515705" y="302109"/>
+                          <a:pt x="2499116" y="713918"/>
+                          <a:pt x="2564525" y="1033513"/>
+                        </a:cubicBezTo>
+                        <a:cubicBezTo>
+                          <a:pt x="2570313" y="1148361"/>
+                          <a:pt x="2477593" y="1228667"/>
+                          <a:pt x="2357818" y="1240220"/>
+                        </a:cubicBezTo>
+                        <a:cubicBezTo>
+                          <a:pt x="1367440" y="1327859"/>
+                          <a:pt x="894978" y="1167541"/>
+                          <a:pt x="206707" y="1240220"/>
+                        </a:cubicBezTo>
+                        <a:cubicBezTo>
+                          <a:pt x="91495" y="1230195"/>
+                          <a:pt x="-12916" y="1165624"/>
+                          <a:pt x="0" y="1033513"/>
+                        </a:cubicBezTo>
+                        <a:cubicBezTo>
+                          <a:pt x="-6605" y="803162"/>
+                          <a:pt x="-2922" y="504459"/>
+                          <a:pt x="0" y="206707"/>
+                        </a:cubicBezTo>
+                        <a:close/>
+                      </a:path>
+                    </a:pathLst>
+                  </a:custGeom>
+                  <ask:type>
+                    <ask:lineSketchNone/>
+                  </ask:type>
+                </ask:lineSketchStyleProps>
+              </a:ext>
+            </a:extLst>
+          </a:ln>
+        </p:spPr>
+        <p:style>
+          <a:lnRef idx="2">
+            <a:schemeClr val="accent1">
+              <a:shade val="15000"/>
+            </a:schemeClr>
+          </a:lnRef>
+          <a:fillRef idx="1">
+            <a:schemeClr val="accent1"/>
+          </a:fillRef>
+          <a:effectRef idx="0">
+            <a:schemeClr val="accent1"/>
+          </a:effectRef>
+          <a:fontRef idx="minor">
+            <a:schemeClr val="lt1"/>
+          </a:fontRef>
+        </p:style>
+        <p:txBody>
+          <a:bodyPr rtlCol="0" anchor="ctr"/>
+          <a:lstStyle/>
+          <a:p>
+            <a:pPr algn="ctr"/>
+            <a:r>
+              <a:rPr lang="en-DE" dirty="0">
+                <a:solidFill>
+                  <a:schemeClr val="tx1"/>
+                </a:solidFill>
+              </a:rPr>
+              <a:t>UMAP Dimensionality Reduction</a:t>
+            </a:r>
+          </a:p>
+        </p:txBody>
+      </p:sp>
+      <p:sp>
+        <p:nvSpPr>
+          <p:cNvPr id="6" name="Rounded Rectangle 5">
+            <a:extLst>
+              <a:ext uri="{FF2B5EF4-FFF2-40B4-BE49-F238E27FC236}">
+                <a16:creationId xmlns:a16="http://schemas.microsoft.com/office/drawing/2014/main" id="{ADBBE059-3CF4-6AFE-31E5-C1F1ED4A0559}"/>
+              </a:ext>
+            </a:extLst>
+          </p:cNvPr>
+          <p:cNvSpPr/>
+          <p:nvPr/>
+        </p:nvSpPr>
+        <p:spPr>
+          <a:xfrm>
+            <a:off x="6351750" y="2938080"/>
+            <a:ext cx="2564525" cy="1240220"/>
+          </a:xfrm>
+          <a:prstGeom prst="roundRect">
+            <a:avLst/>
+          </a:prstGeom>
+          <a:noFill/>
+          <a:ln>
+            <a:extLst>
+              <a:ext uri="{C807C97D-BFC1-408E-A445-0C87EB9F89A2}">
+                <ask:lineSketchStyleProps xmlns:ask="http://schemas.microsoft.com/office/drawing/2018/sketchyshapes" sd="1219033472">
+                  <a:custGeom>
+                    <a:avLst/>
+                    <a:gdLst>
+                      <a:gd name="connsiteX0" fmla="*/ 0 w 2564525"/>
+                      <a:gd name="connsiteY0" fmla="*/ 206707 h 1240220"/>
+                      <a:gd name="connsiteX1" fmla="*/ 206707 w 2564525"/>
+                      <a:gd name="connsiteY1" fmla="*/ 0 h 1240220"/>
+                      <a:gd name="connsiteX2" fmla="*/ 2357818 w 2564525"/>
+                      <a:gd name="connsiteY2" fmla="*/ 0 h 1240220"/>
+                      <a:gd name="connsiteX3" fmla="*/ 2564525 w 2564525"/>
+                      <a:gd name="connsiteY3" fmla="*/ 206707 h 1240220"/>
+                      <a:gd name="connsiteX4" fmla="*/ 2564525 w 2564525"/>
+                      <a:gd name="connsiteY4" fmla="*/ 1033513 h 1240220"/>
+                      <a:gd name="connsiteX5" fmla="*/ 2357818 w 2564525"/>
+                      <a:gd name="connsiteY5" fmla="*/ 1240220 h 1240220"/>
+                      <a:gd name="connsiteX6" fmla="*/ 206707 w 2564525"/>
+                      <a:gd name="connsiteY6" fmla="*/ 1240220 h 1240220"/>
+                      <a:gd name="connsiteX7" fmla="*/ 0 w 2564525"/>
+                      <a:gd name="connsiteY7" fmla="*/ 1033513 h 1240220"/>
+                      <a:gd name="connsiteX8" fmla="*/ 0 w 2564525"/>
+                      <a:gd name="connsiteY8" fmla="*/ 206707 h 1240220"/>
+                    </a:gdLst>
+                    <a:ahLst/>
+                    <a:cxnLst>
+                      <a:cxn ang="0">
+                        <a:pos x="connsiteX0" y="connsiteY0"/>
+                      </a:cxn>
+                      <a:cxn ang="0">
+                        <a:pos x="connsiteX1" y="connsiteY1"/>
+                      </a:cxn>
+                      <a:cxn ang="0">
+                        <a:pos x="connsiteX2" y="connsiteY2"/>
+                      </a:cxn>
+                      <a:cxn ang="0">
+                        <a:pos x="connsiteX3" y="connsiteY3"/>
+                      </a:cxn>
+                      <a:cxn ang="0">
+                        <a:pos x="connsiteX4" y="connsiteY4"/>
+                      </a:cxn>
+                      <a:cxn ang="0">
+                        <a:pos x="connsiteX5" y="connsiteY5"/>
+                      </a:cxn>
+                      <a:cxn ang="0">
+                        <a:pos x="connsiteX6" y="connsiteY6"/>
+                      </a:cxn>
+                      <a:cxn ang="0">
+                        <a:pos x="connsiteX7" y="connsiteY7"/>
+                      </a:cxn>
+                      <a:cxn ang="0">
+                        <a:pos x="connsiteX8" y="connsiteY8"/>
+                      </a:cxn>
+                    </a:cxnLst>
+                    <a:rect l="l" t="t" r="r" b="b"/>
+                    <a:pathLst>
+                      <a:path w="2564525" h="1240220" extrusionOk="0">
+                        <a:moveTo>
+                          <a:pt x="0" y="206707"/>
+                        </a:moveTo>
+                        <a:cubicBezTo>
+                          <a:pt x="-5200" y="89339"/>
+                          <a:pt x="80750" y="4427"/>
+                          <a:pt x="206707" y="0"/>
+                        </a:cubicBezTo>
+                        <a:cubicBezTo>
+                          <a:pt x="775030" y="132882"/>
+                          <a:pt x="1288917" y="-84951"/>
+                          <a:pt x="2357818" y="0"/>
+                        </a:cubicBezTo>
+                        <a:cubicBezTo>
+                          <a:pt x="2458816" y="12855"/>
+                          <a:pt x="2561166" y="111110"/>
+                          <a:pt x="2564525" y="206707"/>
+                        </a:cubicBezTo>
+                        <a:cubicBezTo>
+                          <a:pt x="2515705" y="302109"/>
+                          <a:pt x="2499116" y="713918"/>
+                          <a:pt x="2564525" y="1033513"/>
+                        </a:cubicBezTo>
+                        <a:cubicBezTo>
+                          <a:pt x="2570313" y="1148361"/>
+                          <a:pt x="2477593" y="1228667"/>
+                          <a:pt x="2357818" y="1240220"/>
+                        </a:cubicBezTo>
+                        <a:cubicBezTo>
+                          <a:pt x="1367440" y="1327859"/>
+                          <a:pt x="894978" y="1167541"/>
+                          <a:pt x="206707" y="1240220"/>
+                        </a:cubicBezTo>
+                        <a:cubicBezTo>
+                          <a:pt x="91495" y="1230195"/>
+                          <a:pt x="-12916" y="1165624"/>
+                          <a:pt x="0" y="1033513"/>
+                        </a:cubicBezTo>
+                        <a:cubicBezTo>
+                          <a:pt x="-6605" y="803162"/>
+                          <a:pt x="-2922" y="504459"/>
+                          <a:pt x="0" y="206707"/>
+                        </a:cubicBezTo>
+                        <a:close/>
+                      </a:path>
+                    </a:pathLst>
+                  </a:custGeom>
+                  <ask:type>
+                    <ask:lineSketchNone/>
+                  </ask:type>
+                </ask:lineSketchStyleProps>
+              </a:ext>
+            </a:extLst>
+          </a:ln>
+        </p:spPr>
+        <p:style>
+          <a:lnRef idx="2">
+            <a:schemeClr val="accent1">
+              <a:shade val="15000"/>
+            </a:schemeClr>
+          </a:lnRef>
+          <a:fillRef idx="1">
+            <a:schemeClr val="accent1"/>
+          </a:fillRef>
+          <a:effectRef idx="0">
+            <a:schemeClr val="accent1"/>
+          </a:effectRef>
+          <a:fontRef idx="minor">
+            <a:schemeClr val="lt1"/>
+          </a:fontRef>
+        </p:style>
+        <p:txBody>
+          <a:bodyPr rtlCol="0" anchor="ctr"/>
+          <a:lstStyle/>
+          <a:p>
+            <a:pPr algn="ctr"/>
+            <a:r>
+              <a:rPr lang="en-DE" dirty="0">
+                <a:solidFill>
+                  <a:schemeClr val="tx1"/>
+                </a:solidFill>
+              </a:rPr>
+              <a:t>DBSCAN Clustering</a:t>
+            </a:r>
+          </a:p>
+        </p:txBody>
+      </p:sp>
+      <p:cxnSp>
+        <p:nvCxnSpPr>
+          <p:cNvPr id="9" name="Elbow Connector 8">
+            <a:extLst>
+              <a:ext uri="{FF2B5EF4-FFF2-40B4-BE49-F238E27FC236}">
+                <a16:creationId xmlns:a16="http://schemas.microsoft.com/office/drawing/2014/main" id="{92764912-4145-16C3-D8C6-3DDF239C7A9F}"/>
+              </a:ext>
+            </a:extLst>
+          </p:cNvPr>
+          <p:cNvCxnSpPr>
+            <a:stCxn id="3" idx="3"/>
+            <a:endCxn id="4" idx="1"/>
+          </p:cNvCxnSpPr>
+          <p:nvPr/>
+        </p:nvCxnSpPr>
+        <p:spPr>
+          <a:xfrm flipV="1">
+            <a:off x="2666125" y="2567590"/>
+            <a:ext cx="560550" cy="880241"/>
+          </a:xfrm>
+          <a:prstGeom prst="bentConnector3">
+            <a:avLst/>
+          </a:prstGeom>
+          <a:ln>
+            <a:tailEnd type="triangle"/>
+          </a:ln>
+        </p:spPr>
+        <p:style>
+          <a:lnRef idx="2">
+            <a:schemeClr val="accent1"/>
+          </a:lnRef>
+          <a:fillRef idx="0">
+            <a:schemeClr val="accent1"/>
+          </a:fillRef>
+          <a:effectRef idx="1">
+            <a:schemeClr val="accent1"/>
+          </a:effectRef>
+          <a:fontRef idx="minor">
+            <a:schemeClr val="tx1"/>
+          </a:fontRef>
+        </p:style>
+      </p:cxnSp>
+      <p:cxnSp>
+        <p:nvCxnSpPr>
+          <p:cNvPr id="11" name="Elbow Connector 10">
+            <a:extLst>
+              <a:ext uri="{FF2B5EF4-FFF2-40B4-BE49-F238E27FC236}">
+                <a16:creationId xmlns:a16="http://schemas.microsoft.com/office/drawing/2014/main" id="{3336C4ED-B8D6-0536-C9AE-DC3B5018985A}"/>
+              </a:ext>
+            </a:extLst>
+          </p:cNvPr>
+          <p:cNvCxnSpPr>
+            <a:stCxn id="3" idx="3"/>
+            <a:endCxn id="5" idx="1"/>
+          </p:cNvCxnSpPr>
+          <p:nvPr/>
+        </p:nvCxnSpPr>
+        <p:spPr>
+          <a:xfrm>
+            <a:off x="2666125" y="3447831"/>
+            <a:ext cx="560550" cy="948559"/>
+          </a:xfrm>
+          <a:prstGeom prst="bentConnector3">
+            <a:avLst/>
+          </a:prstGeom>
+          <a:ln>
+            <a:tailEnd type="triangle"/>
+          </a:ln>
+        </p:spPr>
+        <p:style>
+          <a:lnRef idx="2">
+            <a:schemeClr val="accent1"/>
+          </a:lnRef>
+          <a:fillRef idx="0">
+            <a:schemeClr val="accent1"/>
+          </a:fillRef>
+          <a:effectRef idx="1">
+            <a:schemeClr val="accent1"/>
+          </a:effectRef>
+          <a:fontRef idx="minor">
+            <a:schemeClr val="tx1"/>
+          </a:fontRef>
+        </p:style>
+      </p:cxnSp>
+      <p:cxnSp>
+        <p:nvCxnSpPr>
+          <p:cNvPr id="36" name="Elbow Connector 35">
+            <a:extLst>
+              <a:ext uri="{FF2B5EF4-FFF2-40B4-BE49-F238E27FC236}">
+                <a16:creationId xmlns:a16="http://schemas.microsoft.com/office/drawing/2014/main" id="{98F757C2-85BC-EF66-5540-EA43864505F5}"/>
+              </a:ext>
+            </a:extLst>
+          </p:cNvPr>
+          <p:cNvCxnSpPr>
+            <a:stCxn id="4" idx="3"/>
+            <a:endCxn id="6" idx="1"/>
+          </p:cNvCxnSpPr>
+          <p:nvPr/>
+        </p:nvCxnSpPr>
+        <p:spPr>
+          <a:xfrm>
+            <a:off x="5791200" y="2567590"/>
+            <a:ext cx="560550" cy="990600"/>
+          </a:xfrm>
+          <a:prstGeom prst="bentConnector3">
+            <a:avLst/>
+          </a:prstGeom>
+          <a:ln>
+            <a:tailEnd type="triangle"/>
+          </a:ln>
+        </p:spPr>
+        <p:style>
+          <a:lnRef idx="2">
+            <a:schemeClr val="accent1"/>
+          </a:lnRef>
+          <a:fillRef idx="0">
+            <a:schemeClr val="accent1"/>
+          </a:fillRef>
+          <a:effectRef idx="1">
+            <a:schemeClr val="accent1"/>
+          </a:effectRef>
+          <a:fontRef idx="minor">
+            <a:schemeClr val="tx1"/>
+          </a:fontRef>
+        </p:style>
+      </p:cxnSp>
+      <p:cxnSp>
+        <p:nvCxnSpPr>
+          <p:cNvPr id="38" name="Elbow Connector 37">
+            <a:extLst>
+              <a:ext uri="{FF2B5EF4-FFF2-40B4-BE49-F238E27FC236}">
+                <a16:creationId xmlns:a16="http://schemas.microsoft.com/office/drawing/2014/main" id="{9013DE3D-E428-EDBA-5FB0-73A234E770B6}"/>
+              </a:ext>
+            </a:extLst>
+          </p:cNvPr>
+          <p:cNvCxnSpPr>
+            <a:stCxn id="5" idx="3"/>
+            <a:endCxn id="6" idx="1"/>
+          </p:cNvCxnSpPr>
+          <p:nvPr/>
+        </p:nvCxnSpPr>
+        <p:spPr>
+          <a:xfrm flipV="1">
+            <a:off x="5791200" y="3558190"/>
+            <a:ext cx="560550" cy="838200"/>
+          </a:xfrm>
+          <a:prstGeom prst="bentConnector3">
+            <a:avLst/>
+          </a:prstGeom>
+          <a:ln>
+            <a:tailEnd type="triangle"/>
+          </a:ln>
+        </p:spPr>
+        <p:style>
+          <a:lnRef idx="2">
+            <a:schemeClr val="accent1"/>
+          </a:lnRef>
+          <a:fillRef idx="0">
+            <a:schemeClr val="accent1"/>
+          </a:fillRef>
+          <a:effectRef idx="1">
+            <a:schemeClr val="accent1"/>
+          </a:effectRef>
+          <a:fontRef idx="minor">
+            <a:schemeClr val="tx1"/>
+          </a:fontRef>
+        </p:style>
+      </p:cxnSp>
+      <p:sp>
+        <p:nvSpPr>
+          <p:cNvPr id="39" name="Rounded Rectangle 38">
+            <a:extLst>
+              <a:ext uri="{FF2B5EF4-FFF2-40B4-BE49-F238E27FC236}">
+                <a16:creationId xmlns:a16="http://schemas.microsoft.com/office/drawing/2014/main" id="{21D2ACEB-5F16-E201-ED74-9D462509DE04}"/>
+              </a:ext>
+            </a:extLst>
+          </p:cNvPr>
+          <p:cNvSpPr/>
+          <p:nvPr/>
+        </p:nvSpPr>
+        <p:spPr>
+          <a:xfrm>
+            <a:off x="9196550" y="2938080"/>
+            <a:ext cx="2564525" cy="1240220"/>
+          </a:xfrm>
+          <a:prstGeom prst="roundRect">
+            <a:avLst/>
+          </a:prstGeom>
+          <a:noFill/>
+          <a:ln>
+            <a:extLst>
+              <a:ext uri="{C807C97D-BFC1-408E-A445-0C87EB9F89A2}">
+                <ask:lineSketchStyleProps xmlns:ask="http://schemas.microsoft.com/office/drawing/2018/sketchyshapes" sd="1219033472">
+                  <a:custGeom>
+                    <a:avLst/>
+                    <a:gdLst>
+                      <a:gd name="connsiteX0" fmla="*/ 0 w 2564525"/>
+                      <a:gd name="connsiteY0" fmla="*/ 206707 h 1240220"/>
+                      <a:gd name="connsiteX1" fmla="*/ 206707 w 2564525"/>
+                      <a:gd name="connsiteY1" fmla="*/ 0 h 1240220"/>
+                      <a:gd name="connsiteX2" fmla="*/ 2357818 w 2564525"/>
+                      <a:gd name="connsiteY2" fmla="*/ 0 h 1240220"/>
+                      <a:gd name="connsiteX3" fmla="*/ 2564525 w 2564525"/>
+                      <a:gd name="connsiteY3" fmla="*/ 206707 h 1240220"/>
+                      <a:gd name="connsiteX4" fmla="*/ 2564525 w 2564525"/>
+                      <a:gd name="connsiteY4" fmla="*/ 1033513 h 1240220"/>
+                      <a:gd name="connsiteX5" fmla="*/ 2357818 w 2564525"/>
+                      <a:gd name="connsiteY5" fmla="*/ 1240220 h 1240220"/>
+                      <a:gd name="connsiteX6" fmla="*/ 206707 w 2564525"/>
+                      <a:gd name="connsiteY6" fmla="*/ 1240220 h 1240220"/>
+                      <a:gd name="connsiteX7" fmla="*/ 0 w 2564525"/>
+                      <a:gd name="connsiteY7" fmla="*/ 1033513 h 1240220"/>
+                      <a:gd name="connsiteX8" fmla="*/ 0 w 2564525"/>
+                      <a:gd name="connsiteY8" fmla="*/ 206707 h 1240220"/>
+                    </a:gdLst>
+                    <a:ahLst/>
+                    <a:cxnLst>
+                      <a:cxn ang="0">
+                        <a:pos x="connsiteX0" y="connsiteY0"/>
+                      </a:cxn>
+                      <a:cxn ang="0">
+                        <a:pos x="connsiteX1" y="connsiteY1"/>
+                      </a:cxn>
+                      <a:cxn ang="0">
+                        <a:pos x="connsiteX2" y="connsiteY2"/>
+                      </a:cxn>
+                      <a:cxn ang="0">
+                        <a:pos x="connsiteX3" y="connsiteY3"/>
+                      </a:cxn>
+                      <a:cxn ang="0">
+                        <a:pos x="connsiteX4" y="connsiteY4"/>
+                      </a:cxn>
+                      <a:cxn ang="0">
+                        <a:pos x="connsiteX5" y="connsiteY5"/>
+                      </a:cxn>
+                      <a:cxn ang="0">
+                        <a:pos x="connsiteX6" y="connsiteY6"/>
+                      </a:cxn>
+                      <a:cxn ang="0">
+                        <a:pos x="connsiteX7" y="connsiteY7"/>
+                      </a:cxn>
+                      <a:cxn ang="0">
+                        <a:pos x="connsiteX8" y="connsiteY8"/>
+                      </a:cxn>
+                    </a:cxnLst>
+                    <a:rect l="l" t="t" r="r" b="b"/>
+                    <a:pathLst>
+                      <a:path w="2564525" h="1240220" extrusionOk="0">
+                        <a:moveTo>
+                          <a:pt x="0" y="206707"/>
+                        </a:moveTo>
+                        <a:cubicBezTo>
+                          <a:pt x="-5200" y="89339"/>
+                          <a:pt x="80750" y="4427"/>
+                          <a:pt x="206707" y="0"/>
+                        </a:cubicBezTo>
+                        <a:cubicBezTo>
+                          <a:pt x="775030" y="132882"/>
+                          <a:pt x="1288917" y="-84951"/>
+                          <a:pt x="2357818" y="0"/>
+                        </a:cubicBezTo>
+                        <a:cubicBezTo>
+                          <a:pt x="2458816" y="12855"/>
+                          <a:pt x="2561166" y="111110"/>
+                          <a:pt x="2564525" y="206707"/>
+                        </a:cubicBezTo>
+                        <a:cubicBezTo>
+                          <a:pt x="2515705" y="302109"/>
+                          <a:pt x="2499116" y="713918"/>
+                          <a:pt x="2564525" y="1033513"/>
+                        </a:cubicBezTo>
+                        <a:cubicBezTo>
+                          <a:pt x="2570313" y="1148361"/>
+                          <a:pt x="2477593" y="1228667"/>
+                          <a:pt x="2357818" y="1240220"/>
+                        </a:cubicBezTo>
+                        <a:cubicBezTo>
+                          <a:pt x="1367440" y="1327859"/>
+                          <a:pt x="894978" y="1167541"/>
+                          <a:pt x="206707" y="1240220"/>
+                        </a:cubicBezTo>
+                        <a:cubicBezTo>
+                          <a:pt x="91495" y="1230195"/>
+                          <a:pt x="-12916" y="1165624"/>
+                          <a:pt x="0" y="1033513"/>
+                        </a:cubicBezTo>
+                        <a:cubicBezTo>
+                          <a:pt x="-6605" y="803162"/>
+                          <a:pt x="-2922" y="504459"/>
+                          <a:pt x="0" y="206707"/>
+                        </a:cubicBezTo>
+                        <a:close/>
+                      </a:path>
+                    </a:pathLst>
+                  </a:custGeom>
+                  <ask:type>
+                    <ask:lineSketchNone/>
+                  </ask:type>
+                </ask:lineSketchStyleProps>
+              </a:ext>
+            </a:extLst>
+          </a:ln>
+        </p:spPr>
+        <p:style>
+          <a:lnRef idx="2">
+            <a:schemeClr val="accent1">
+              <a:shade val="15000"/>
+            </a:schemeClr>
+          </a:lnRef>
+          <a:fillRef idx="1">
+            <a:schemeClr val="accent1"/>
+          </a:fillRef>
+          <a:effectRef idx="0">
+            <a:schemeClr val="accent1"/>
+          </a:effectRef>
+          <a:fontRef idx="minor">
+            <a:schemeClr val="lt1"/>
+          </a:fontRef>
+        </p:style>
+        <p:txBody>
+          <a:bodyPr rtlCol="0" anchor="ctr"/>
+          <a:lstStyle/>
+          <a:p>
+            <a:pPr algn="ctr"/>
+            <a:r>
+              <a:rPr lang="en-DE" dirty="0">
+                <a:solidFill>
+                  <a:schemeClr val="tx1"/>
+                </a:solidFill>
+              </a:rPr>
+              <a:t>Cluster Centroid</a:t>
+            </a:r>
+          </a:p>
+        </p:txBody>
+      </p:sp>
+      <p:cxnSp>
+        <p:nvCxnSpPr>
+          <p:cNvPr id="44" name="Straight Arrow Connector 43">
+            <a:extLst>
+              <a:ext uri="{FF2B5EF4-FFF2-40B4-BE49-F238E27FC236}">
+                <a16:creationId xmlns:a16="http://schemas.microsoft.com/office/drawing/2014/main" id="{E31D5979-B043-DBBD-C0E8-E723AC72C92F}"/>
+              </a:ext>
+            </a:extLst>
+          </p:cNvPr>
+          <p:cNvCxnSpPr>
+            <a:stCxn id="6" idx="3"/>
+            <a:endCxn id="39" idx="1"/>
+          </p:cNvCxnSpPr>
+          <p:nvPr/>
+        </p:nvCxnSpPr>
+        <p:spPr>
+          <a:xfrm>
+            <a:off x="8916275" y="3558190"/>
+            <a:ext cx="280275" cy="0"/>
+          </a:xfrm>
+          <a:prstGeom prst="straightConnector1">
+            <a:avLst/>
+          </a:prstGeom>
+          <a:ln>
+            <a:tailEnd type="triangle"/>
+          </a:ln>
+        </p:spPr>
+        <p:style>
+          <a:lnRef idx="2">
+            <a:schemeClr val="accent1"/>
+          </a:lnRef>
+          <a:fillRef idx="0">
+            <a:schemeClr val="accent1"/>
+          </a:fillRef>
+          <a:effectRef idx="1">
+            <a:schemeClr val="accent1"/>
+          </a:effectRef>
+          <a:fontRef idx="minor">
+            <a:schemeClr val="tx1"/>
+          </a:fontRef>
+        </p:style>
+      </p:cxnSp>
+    </p:spTree>
+    <p:extLst>
+      <p:ext uri="{BB962C8B-B14F-4D97-AF65-F5344CB8AC3E}">
+        <p14:creationId xmlns:p14="http://schemas.microsoft.com/office/powerpoint/2010/main" val="217594113"/>
       </p:ext>
     </p:extLst>
   </p:cSld>

</xml_diff>

<commit_message>
Intro to variables, refined the JS playground
</commit_message>
<xml_diff>
--- a/static/files/graphics.pptx
+++ b/static/files/graphics.pptx
@@ -11,8 +11,11 @@
     <p:sldId id="259" r:id="rId5"/>
     <p:sldId id="262" r:id="rId6"/>
     <p:sldId id="263" r:id="rId7"/>
-    <p:sldId id="260" r:id="rId8"/>
-    <p:sldId id="261" r:id="rId9"/>
+    <p:sldId id="264" r:id="rId8"/>
+    <p:sldId id="260" r:id="rId9"/>
+    <p:sldId id="261" r:id="rId10"/>
+    <p:sldId id="265" r:id="rId11"/>
+    <p:sldId id="266" r:id="rId12"/>
   </p:sldIdLst>
   <p:sldSz cx="12192000" cy="6858000"/>
   <p:notesSz cx="6858000" cy="9144000"/>
@@ -3417,6 +3420,1638 @@
 </p:sld>
 </file>
 
+<file path=ppt/slides/slide10.xml><?xml version="1.0" encoding="utf-8"?>
+<p:sld xmlns:a="http://schemas.openxmlformats.org/drawingml/2006/main" xmlns:r="http://schemas.openxmlformats.org/officeDocument/2006/relationships" xmlns:p="http://schemas.openxmlformats.org/presentationml/2006/main">
+  <p:cSld>
+    <p:spTree>
+      <p:nvGrpSpPr>
+        <p:cNvPr id="1" name=""/>
+        <p:cNvGrpSpPr/>
+        <p:nvPr/>
+      </p:nvGrpSpPr>
+      <p:grpSpPr>
+        <a:xfrm>
+          <a:off x="0" y="0"/>
+          <a:ext cx="0" cy="0"/>
+          <a:chOff x="0" y="0"/>
+          <a:chExt cx="0" cy="0"/>
+        </a:xfrm>
+      </p:grpSpPr>
+      <p:sp>
+        <p:nvSpPr>
+          <p:cNvPr id="30" name="Oval 29">
+            <a:extLst>
+              <a:ext uri="{FF2B5EF4-FFF2-40B4-BE49-F238E27FC236}">
+                <a16:creationId xmlns:a16="http://schemas.microsoft.com/office/drawing/2014/main" id="{29279EB2-1355-AAE2-34A0-9C53303A33CB}"/>
+              </a:ext>
+            </a:extLst>
+          </p:cNvPr>
+          <p:cNvSpPr/>
+          <p:nvPr/>
+        </p:nvSpPr>
+        <p:spPr>
+          <a:xfrm>
+            <a:off x="5347447" y="2671483"/>
+            <a:ext cx="1281953" cy="1281953"/>
+          </a:xfrm>
+          <a:prstGeom prst="ellipse">
+            <a:avLst/>
+          </a:prstGeom>
+        </p:spPr>
+        <p:style>
+          <a:lnRef idx="2">
+            <a:schemeClr val="accent1">
+              <a:shade val="15000"/>
+            </a:schemeClr>
+          </a:lnRef>
+          <a:fillRef idx="1">
+            <a:schemeClr val="accent1"/>
+          </a:fillRef>
+          <a:effectRef idx="0">
+            <a:schemeClr val="accent1"/>
+          </a:effectRef>
+          <a:fontRef idx="minor">
+            <a:schemeClr val="lt1"/>
+          </a:fontRef>
+        </p:style>
+        <p:txBody>
+          <a:bodyPr rtlCol="0" anchor="ctr"/>
+          <a:lstStyle/>
+          <a:p>
+            <a:pPr algn="ctr"/>
+            <a:r>
+              <a:rPr lang="en-DE" sz="1050" dirty="0"/>
+              <a:t>Developing Docker Apps – Core Principles</a:t>
+            </a:r>
+          </a:p>
+        </p:txBody>
+      </p:sp>
+      <p:sp>
+        <p:nvSpPr>
+          <p:cNvPr id="31" name="Oval 30">
+            <a:extLst>
+              <a:ext uri="{FF2B5EF4-FFF2-40B4-BE49-F238E27FC236}">
+                <a16:creationId xmlns:a16="http://schemas.microsoft.com/office/drawing/2014/main" id="{AD2AD48D-322A-0878-5325-325C7C0032C9}"/>
+              </a:ext>
+            </a:extLst>
+          </p:cNvPr>
+          <p:cNvSpPr/>
+          <p:nvPr/>
+        </p:nvSpPr>
+        <p:spPr>
+          <a:xfrm>
+            <a:off x="3514851" y="1629357"/>
+            <a:ext cx="1218514" cy="1259409"/>
+          </a:xfrm>
+          <a:prstGeom prst="ellipse">
+            <a:avLst/>
+          </a:prstGeom>
+        </p:spPr>
+        <p:style>
+          <a:lnRef idx="2">
+            <a:schemeClr val="accent1">
+              <a:shade val="15000"/>
+            </a:schemeClr>
+          </a:lnRef>
+          <a:fillRef idx="1">
+            <a:schemeClr val="accent1"/>
+          </a:fillRef>
+          <a:effectRef idx="0">
+            <a:schemeClr val="accent1"/>
+          </a:effectRef>
+          <a:fontRef idx="minor">
+            <a:schemeClr val="lt1"/>
+          </a:fontRef>
+        </p:style>
+        <p:txBody>
+          <a:bodyPr rtlCol="0" anchor="ctr"/>
+          <a:lstStyle/>
+          <a:p>
+            <a:pPr algn="ctr"/>
+            <a:r>
+              <a:rPr lang="en-DE" sz="1050" dirty="0"/>
+              <a:t>Cloud Engineering</a:t>
+            </a:r>
+          </a:p>
+        </p:txBody>
+      </p:sp>
+      <p:sp>
+        <p:nvSpPr>
+          <p:cNvPr id="32" name="Oval 31">
+            <a:extLst>
+              <a:ext uri="{FF2B5EF4-FFF2-40B4-BE49-F238E27FC236}">
+                <a16:creationId xmlns:a16="http://schemas.microsoft.com/office/drawing/2014/main" id="{9CEC6B05-3F08-052D-B730-10E351B38748}"/>
+              </a:ext>
+            </a:extLst>
+          </p:cNvPr>
+          <p:cNvSpPr/>
+          <p:nvPr/>
+        </p:nvSpPr>
+        <p:spPr>
+          <a:xfrm>
+            <a:off x="7231668" y="1833196"/>
+            <a:ext cx="1281953" cy="1281953"/>
+          </a:xfrm>
+          <a:prstGeom prst="ellipse">
+            <a:avLst/>
+          </a:prstGeom>
+        </p:spPr>
+        <p:style>
+          <a:lnRef idx="2">
+            <a:schemeClr val="accent1">
+              <a:shade val="15000"/>
+            </a:schemeClr>
+          </a:lnRef>
+          <a:fillRef idx="1">
+            <a:schemeClr val="accent1"/>
+          </a:fillRef>
+          <a:effectRef idx="0">
+            <a:schemeClr val="accent1"/>
+          </a:effectRef>
+          <a:fontRef idx="minor">
+            <a:schemeClr val="lt1"/>
+          </a:fontRef>
+        </p:style>
+        <p:txBody>
+          <a:bodyPr rtlCol="0" anchor="ctr"/>
+          <a:lstStyle/>
+          <a:p>
+            <a:pPr algn="ctr"/>
+            <a:r>
+              <a:rPr lang="en-DE" sz="1050" dirty="0"/>
+              <a:t>Docker</a:t>
+            </a:r>
+          </a:p>
+        </p:txBody>
+      </p:sp>
+      <p:sp>
+        <p:nvSpPr>
+          <p:cNvPr id="33" name="Oval 32">
+            <a:extLst>
+              <a:ext uri="{FF2B5EF4-FFF2-40B4-BE49-F238E27FC236}">
+                <a16:creationId xmlns:a16="http://schemas.microsoft.com/office/drawing/2014/main" id="{7C3C84DA-4D5D-74F7-D7D4-FCAE7B340CA9}"/>
+              </a:ext>
+            </a:extLst>
+          </p:cNvPr>
+          <p:cNvSpPr/>
+          <p:nvPr/>
+        </p:nvSpPr>
+        <p:spPr>
+          <a:xfrm>
+            <a:off x="9052888" y="1481612"/>
+            <a:ext cx="1281953" cy="1281953"/>
+          </a:xfrm>
+          <a:prstGeom prst="ellipse">
+            <a:avLst/>
+          </a:prstGeom>
+        </p:spPr>
+        <p:style>
+          <a:lnRef idx="2">
+            <a:schemeClr val="accent1">
+              <a:shade val="15000"/>
+            </a:schemeClr>
+          </a:lnRef>
+          <a:fillRef idx="1">
+            <a:schemeClr val="accent1"/>
+          </a:fillRef>
+          <a:effectRef idx="0">
+            <a:schemeClr val="accent1"/>
+          </a:effectRef>
+          <a:fontRef idx="minor">
+            <a:schemeClr val="lt1"/>
+          </a:fontRef>
+        </p:style>
+        <p:txBody>
+          <a:bodyPr rtlCol="0" anchor="ctr"/>
+          <a:lstStyle/>
+          <a:p>
+            <a:pPr algn="ctr"/>
+            <a:r>
+              <a:rPr lang="en-DE" sz="1050" dirty="0"/>
+              <a:t>Technology</a:t>
+            </a:r>
+          </a:p>
+        </p:txBody>
+      </p:sp>
+      <p:sp>
+        <p:nvSpPr>
+          <p:cNvPr id="34" name="Oval 33">
+            <a:extLst>
+              <a:ext uri="{FF2B5EF4-FFF2-40B4-BE49-F238E27FC236}">
+                <a16:creationId xmlns:a16="http://schemas.microsoft.com/office/drawing/2014/main" id="{26E3C4AB-EA1A-71C1-BE29-50C45170B4FF}"/>
+              </a:ext>
+            </a:extLst>
+          </p:cNvPr>
+          <p:cNvSpPr/>
+          <p:nvPr/>
+        </p:nvSpPr>
+        <p:spPr>
+          <a:xfrm>
+            <a:off x="1797078" y="1481612"/>
+            <a:ext cx="1218514" cy="1259409"/>
+          </a:xfrm>
+          <a:prstGeom prst="ellipse">
+            <a:avLst/>
+          </a:prstGeom>
+        </p:spPr>
+        <p:style>
+          <a:lnRef idx="2">
+            <a:schemeClr val="accent1">
+              <a:shade val="15000"/>
+            </a:schemeClr>
+          </a:lnRef>
+          <a:fillRef idx="1">
+            <a:schemeClr val="accent1"/>
+          </a:fillRef>
+          <a:effectRef idx="0">
+            <a:schemeClr val="accent1"/>
+          </a:effectRef>
+          <a:fontRef idx="minor">
+            <a:schemeClr val="lt1"/>
+          </a:fontRef>
+        </p:style>
+        <p:txBody>
+          <a:bodyPr rtlCol="0" anchor="ctr"/>
+          <a:lstStyle/>
+          <a:p>
+            <a:pPr algn="ctr"/>
+            <a:r>
+              <a:rPr lang="en-DE" sz="1050" dirty="0"/>
+              <a:t>Class</a:t>
+            </a:r>
+          </a:p>
+        </p:txBody>
+      </p:sp>
+      <p:sp>
+        <p:nvSpPr>
+          <p:cNvPr id="35" name="Oval 34">
+            <a:extLst>
+              <a:ext uri="{FF2B5EF4-FFF2-40B4-BE49-F238E27FC236}">
+                <a16:creationId xmlns:a16="http://schemas.microsoft.com/office/drawing/2014/main" id="{49986016-19E6-CCA4-0D13-3E2128E98103}"/>
+              </a:ext>
+            </a:extLst>
+          </p:cNvPr>
+          <p:cNvSpPr/>
+          <p:nvPr/>
+        </p:nvSpPr>
+        <p:spPr>
+          <a:xfrm>
+            <a:off x="2852492" y="3312459"/>
+            <a:ext cx="1218514" cy="1259409"/>
+          </a:xfrm>
+          <a:prstGeom prst="ellipse">
+            <a:avLst/>
+          </a:prstGeom>
+        </p:spPr>
+        <p:style>
+          <a:lnRef idx="2">
+            <a:schemeClr val="accent1">
+              <a:shade val="15000"/>
+            </a:schemeClr>
+          </a:lnRef>
+          <a:fillRef idx="1">
+            <a:schemeClr val="accent1"/>
+          </a:fillRef>
+          <a:effectRef idx="0">
+            <a:schemeClr val="accent1"/>
+          </a:effectRef>
+          <a:fontRef idx="minor">
+            <a:schemeClr val="lt1"/>
+          </a:fontRef>
+        </p:style>
+        <p:txBody>
+          <a:bodyPr rtlCol="0" anchor="ctr"/>
+          <a:lstStyle/>
+          <a:p>
+            <a:pPr algn="ctr"/>
+            <a:r>
+              <a:rPr lang="en-DE" sz="1050" dirty="0"/>
+              <a:t>Training</a:t>
+            </a:r>
+          </a:p>
+        </p:txBody>
+      </p:sp>
+      <p:sp>
+        <p:nvSpPr>
+          <p:cNvPr id="37" name="Oval 36">
+            <a:extLst>
+              <a:ext uri="{FF2B5EF4-FFF2-40B4-BE49-F238E27FC236}">
+                <a16:creationId xmlns:a16="http://schemas.microsoft.com/office/drawing/2014/main" id="{57A37507-1404-150D-42E9-2B939298EEF5}"/>
+              </a:ext>
+            </a:extLst>
+          </p:cNvPr>
+          <p:cNvSpPr/>
+          <p:nvPr/>
+        </p:nvSpPr>
+        <p:spPr>
+          <a:xfrm>
+            <a:off x="6703167" y="4071477"/>
+            <a:ext cx="1218514" cy="1259409"/>
+          </a:xfrm>
+          <a:prstGeom prst="ellipse">
+            <a:avLst/>
+          </a:prstGeom>
+        </p:spPr>
+        <p:style>
+          <a:lnRef idx="2">
+            <a:schemeClr val="accent1">
+              <a:shade val="15000"/>
+            </a:schemeClr>
+          </a:lnRef>
+          <a:fillRef idx="1">
+            <a:schemeClr val="accent1"/>
+          </a:fillRef>
+          <a:effectRef idx="0">
+            <a:schemeClr val="accent1"/>
+          </a:effectRef>
+          <a:fontRef idx="minor">
+            <a:schemeClr val="lt1"/>
+          </a:fontRef>
+        </p:style>
+        <p:txBody>
+          <a:bodyPr rtlCol="0" anchor="ctr"/>
+          <a:lstStyle/>
+          <a:p>
+            <a:pPr algn="ctr"/>
+            <a:r>
+              <a:rPr lang="en-DE" sz="1050" dirty="0"/>
+              <a:t>Best Practices for Docker</a:t>
+            </a:r>
+          </a:p>
+        </p:txBody>
+      </p:sp>
+      <p:sp>
+        <p:nvSpPr>
+          <p:cNvPr id="40" name="Oval 39">
+            <a:extLst>
+              <a:ext uri="{FF2B5EF4-FFF2-40B4-BE49-F238E27FC236}">
+                <a16:creationId xmlns:a16="http://schemas.microsoft.com/office/drawing/2014/main" id="{BB6F531A-EC26-2164-E29D-4053083A943A}"/>
+              </a:ext>
+            </a:extLst>
+          </p:cNvPr>
+          <p:cNvSpPr/>
+          <p:nvPr/>
+        </p:nvSpPr>
+        <p:spPr>
+          <a:xfrm>
+            <a:off x="8012983" y="3323731"/>
+            <a:ext cx="1218514" cy="1259409"/>
+          </a:xfrm>
+          <a:prstGeom prst="ellipse">
+            <a:avLst/>
+          </a:prstGeom>
+        </p:spPr>
+        <p:style>
+          <a:lnRef idx="2">
+            <a:schemeClr val="accent1">
+              <a:shade val="15000"/>
+            </a:schemeClr>
+          </a:lnRef>
+          <a:fillRef idx="1">
+            <a:schemeClr val="accent1"/>
+          </a:fillRef>
+          <a:effectRef idx="0">
+            <a:schemeClr val="accent1"/>
+          </a:effectRef>
+          <a:fontRef idx="minor">
+            <a:schemeClr val="lt1"/>
+          </a:fontRef>
+        </p:style>
+        <p:txBody>
+          <a:bodyPr rtlCol="0" anchor="ctr"/>
+          <a:lstStyle/>
+          <a:p>
+            <a:pPr algn="ctr"/>
+            <a:r>
+              <a:rPr lang="en-DE" sz="1050" dirty="0"/>
+              <a:t>Container Workflows</a:t>
+            </a:r>
+          </a:p>
+        </p:txBody>
+      </p:sp>
+      <p:cxnSp>
+        <p:nvCxnSpPr>
+          <p:cNvPr id="41" name="Straight Arrow Connector 40">
+            <a:extLst>
+              <a:ext uri="{FF2B5EF4-FFF2-40B4-BE49-F238E27FC236}">
+                <a16:creationId xmlns:a16="http://schemas.microsoft.com/office/drawing/2014/main" id="{4DD5D201-F2F0-6B5F-FA8B-56B2D59021EC}"/>
+              </a:ext>
+            </a:extLst>
+          </p:cNvPr>
+          <p:cNvCxnSpPr>
+            <a:cxnSpLocks/>
+          </p:cNvCxnSpPr>
+          <p:nvPr/>
+        </p:nvCxnSpPr>
+        <p:spPr>
+          <a:xfrm flipV="1">
+            <a:off x="6558187" y="2935528"/>
+            <a:ext cx="790006" cy="385049"/>
+          </a:xfrm>
+          <a:prstGeom prst="straightConnector1">
+            <a:avLst/>
+          </a:prstGeom>
+          <a:ln w="19050">
+            <a:tailEnd type="triangle"/>
+          </a:ln>
+        </p:spPr>
+        <p:style>
+          <a:lnRef idx="1">
+            <a:schemeClr val="accent1"/>
+          </a:lnRef>
+          <a:fillRef idx="0">
+            <a:schemeClr val="accent1"/>
+          </a:fillRef>
+          <a:effectRef idx="0">
+            <a:schemeClr val="accent1"/>
+          </a:effectRef>
+          <a:fontRef idx="minor">
+            <a:schemeClr val="tx1"/>
+          </a:fontRef>
+        </p:style>
+      </p:cxnSp>
+      <p:sp>
+        <p:nvSpPr>
+          <p:cNvPr id="42" name="TextBox 41">
+            <a:extLst>
+              <a:ext uri="{FF2B5EF4-FFF2-40B4-BE49-F238E27FC236}">
+                <a16:creationId xmlns:a16="http://schemas.microsoft.com/office/drawing/2014/main" id="{EF220B73-6A97-2DDA-D639-62DACC4A6E88}"/>
+              </a:ext>
+            </a:extLst>
+          </p:cNvPr>
+          <p:cNvSpPr txBox="1"/>
+          <p:nvPr/>
+        </p:nvSpPr>
+        <p:spPr>
+          <a:xfrm rot="20061527">
+            <a:off x="6608385" y="2837508"/>
+            <a:ext cx="689612" cy="253916"/>
+          </a:xfrm>
+          <a:prstGeom prst="rect">
+            <a:avLst/>
+          </a:prstGeom>
+          <a:noFill/>
+        </p:spPr>
+        <p:txBody>
+          <a:bodyPr wrap="none" rtlCol="0">
+            <a:spAutoFit/>
+          </a:bodyPr>
+          <a:lstStyle/>
+          <a:p>
+            <a:r>
+              <a:rPr lang="en-DE" sz="1050" dirty="0"/>
+              <a:t>contains</a:t>
+            </a:r>
+          </a:p>
+        </p:txBody>
+      </p:sp>
+      <p:cxnSp>
+        <p:nvCxnSpPr>
+          <p:cNvPr id="43" name="Straight Arrow Connector 42">
+            <a:extLst>
+              <a:ext uri="{FF2B5EF4-FFF2-40B4-BE49-F238E27FC236}">
+                <a16:creationId xmlns:a16="http://schemas.microsoft.com/office/drawing/2014/main" id="{3B63ACB7-B7AA-10B2-E8A0-03459CDF3D5F}"/>
+              </a:ext>
+            </a:extLst>
+          </p:cNvPr>
+          <p:cNvCxnSpPr>
+            <a:cxnSpLocks/>
+            <a:stCxn id="32" idx="6"/>
+          </p:cNvCxnSpPr>
+          <p:nvPr/>
+        </p:nvCxnSpPr>
+        <p:spPr>
+          <a:xfrm flipV="1">
+            <a:off x="8513621" y="2259061"/>
+            <a:ext cx="539267" cy="215112"/>
+          </a:xfrm>
+          <a:prstGeom prst="straightConnector1">
+            <a:avLst/>
+          </a:prstGeom>
+          <a:ln w="19050">
+            <a:tailEnd type="triangle"/>
+          </a:ln>
+        </p:spPr>
+        <p:style>
+          <a:lnRef idx="1">
+            <a:schemeClr val="accent1"/>
+          </a:lnRef>
+          <a:fillRef idx="0">
+            <a:schemeClr val="accent1"/>
+          </a:fillRef>
+          <a:effectRef idx="0">
+            <a:schemeClr val="accent1"/>
+          </a:effectRef>
+          <a:fontRef idx="minor">
+            <a:schemeClr val="tx1"/>
+          </a:fontRef>
+        </p:style>
+      </p:cxnSp>
+      <p:sp>
+        <p:nvSpPr>
+          <p:cNvPr id="45" name="TextBox 44">
+            <a:extLst>
+              <a:ext uri="{FF2B5EF4-FFF2-40B4-BE49-F238E27FC236}">
+                <a16:creationId xmlns:a16="http://schemas.microsoft.com/office/drawing/2014/main" id="{F8D52A44-E32D-88E2-DE32-A0AF5C7EC7A5}"/>
+              </a:ext>
+            </a:extLst>
+          </p:cNvPr>
+          <p:cNvSpPr txBox="1"/>
+          <p:nvPr/>
+        </p:nvSpPr>
+        <p:spPr>
+          <a:xfrm rot="20277280">
+            <a:off x="8536760" y="2110321"/>
+            <a:ext cx="381836" cy="253916"/>
+          </a:xfrm>
+          <a:prstGeom prst="rect">
+            <a:avLst/>
+          </a:prstGeom>
+          <a:noFill/>
+        </p:spPr>
+        <p:txBody>
+          <a:bodyPr wrap="none" rtlCol="0">
+            <a:spAutoFit/>
+          </a:bodyPr>
+          <a:lstStyle/>
+          <a:p>
+            <a:r>
+              <a:rPr lang="en-GB" sz="1050" dirty="0"/>
+              <a:t>i</a:t>
+            </a:r>
+            <a:r>
+              <a:rPr lang="en-DE" sz="1050" dirty="0"/>
+              <a:t>s a</a:t>
+            </a:r>
+          </a:p>
+        </p:txBody>
+      </p:sp>
+      <p:cxnSp>
+        <p:nvCxnSpPr>
+          <p:cNvPr id="46" name="Straight Arrow Connector 45">
+            <a:extLst>
+              <a:ext uri="{FF2B5EF4-FFF2-40B4-BE49-F238E27FC236}">
+                <a16:creationId xmlns:a16="http://schemas.microsoft.com/office/drawing/2014/main" id="{58584680-B75B-2372-0C5E-3827411B39EE}"/>
+              </a:ext>
+            </a:extLst>
+          </p:cNvPr>
+          <p:cNvCxnSpPr>
+            <a:cxnSpLocks/>
+          </p:cNvCxnSpPr>
+          <p:nvPr/>
+        </p:nvCxnSpPr>
+        <p:spPr>
+          <a:xfrm>
+            <a:off x="6629400" y="3490442"/>
+            <a:ext cx="1383583" cy="274735"/>
+          </a:xfrm>
+          <a:prstGeom prst="straightConnector1">
+            <a:avLst/>
+          </a:prstGeom>
+          <a:ln w="19050">
+            <a:tailEnd type="triangle"/>
+          </a:ln>
+        </p:spPr>
+        <p:style>
+          <a:lnRef idx="1">
+            <a:schemeClr val="accent1"/>
+          </a:lnRef>
+          <a:fillRef idx="0">
+            <a:schemeClr val="accent1"/>
+          </a:fillRef>
+          <a:effectRef idx="0">
+            <a:schemeClr val="accent1"/>
+          </a:effectRef>
+          <a:fontRef idx="minor">
+            <a:schemeClr val="tx1"/>
+          </a:fontRef>
+        </p:style>
+      </p:cxnSp>
+      <p:cxnSp>
+        <p:nvCxnSpPr>
+          <p:cNvPr id="47" name="Straight Arrow Connector 46">
+            <a:extLst>
+              <a:ext uri="{FF2B5EF4-FFF2-40B4-BE49-F238E27FC236}">
+                <a16:creationId xmlns:a16="http://schemas.microsoft.com/office/drawing/2014/main" id="{2ADE4B6B-4319-EAB3-85FD-B38F3CF79F9B}"/>
+              </a:ext>
+            </a:extLst>
+          </p:cNvPr>
+          <p:cNvCxnSpPr>
+            <a:cxnSpLocks/>
+            <a:endCxn id="37" idx="1"/>
+          </p:cNvCxnSpPr>
+          <p:nvPr/>
+        </p:nvCxnSpPr>
+        <p:spPr>
+          <a:xfrm>
+            <a:off x="6338048" y="3780959"/>
+            <a:ext cx="543566" cy="474954"/>
+          </a:xfrm>
+          <a:prstGeom prst="straightConnector1">
+            <a:avLst/>
+          </a:prstGeom>
+          <a:ln w="19050">
+            <a:tailEnd type="triangle"/>
+          </a:ln>
+        </p:spPr>
+        <p:style>
+          <a:lnRef idx="1">
+            <a:schemeClr val="accent1"/>
+          </a:lnRef>
+          <a:fillRef idx="0">
+            <a:schemeClr val="accent1"/>
+          </a:fillRef>
+          <a:effectRef idx="0">
+            <a:schemeClr val="accent1"/>
+          </a:effectRef>
+          <a:fontRef idx="minor">
+            <a:schemeClr val="tx1"/>
+          </a:fontRef>
+        </p:style>
+      </p:cxnSp>
+      <p:sp>
+        <p:nvSpPr>
+          <p:cNvPr id="48" name="TextBox 47">
+            <a:extLst>
+              <a:ext uri="{FF2B5EF4-FFF2-40B4-BE49-F238E27FC236}">
+                <a16:creationId xmlns:a16="http://schemas.microsoft.com/office/drawing/2014/main" id="{3180707E-4C8D-0DE3-FCC4-BD76F4F8538E}"/>
+              </a:ext>
+            </a:extLst>
+          </p:cNvPr>
+          <p:cNvSpPr txBox="1"/>
+          <p:nvPr/>
+        </p:nvSpPr>
+        <p:spPr>
+          <a:xfrm rot="668827">
+            <a:off x="7027202" y="3364947"/>
+            <a:ext cx="689612" cy="253916"/>
+          </a:xfrm>
+          <a:prstGeom prst="rect">
+            <a:avLst/>
+          </a:prstGeom>
+          <a:noFill/>
+        </p:spPr>
+        <p:txBody>
+          <a:bodyPr wrap="none" rtlCol="0">
+            <a:spAutoFit/>
+          </a:bodyPr>
+          <a:lstStyle/>
+          <a:p>
+            <a:r>
+              <a:rPr lang="en-DE" sz="1050" dirty="0"/>
+              <a:t>contains</a:t>
+            </a:r>
+          </a:p>
+        </p:txBody>
+      </p:sp>
+      <p:sp>
+        <p:nvSpPr>
+          <p:cNvPr id="49" name="TextBox 48">
+            <a:extLst>
+              <a:ext uri="{FF2B5EF4-FFF2-40B4-BE49-F238E27FC236}">
+                <a16:creationId xmlns:a16="http://schemas.microsoft.com/office/drawing/2014/main" id="{C667EA79-C99A-C3CF-6029-BFC684DA6CA1}"/>
+              </a:ext>
+            </a:extLst>
+          </p:cNvPr>
+          <p:cNvSpPr txBox="1"/>
+          <p:nvPr/>
+        </p:nvSpPr>
+        <p:spPr>
+          <a:xfrm rot="2449792">
+            <a:off x="6402220" y="3786990"/>
+            <a:ext cx="689612" cy="253916"/>
+          </a:xfrm>
+          <a:prstGeom prst="rect">
+            <a:avLst/>
+          </a:prstGeom>
+          <a:noFill/>
+        </p:spPr>
+        <p:txBody>
+          <a:bodyPr wrap="none" rtlCol="0">
+            <a:spAutoFit/>
+          </a:bodyPr>
+          <a:lstStyle/>
+          <a:p>
+            <a:r>
+              <a:rPr lang="en-DE" sz="1050" dirty="0"/>
+              <a:t>contains</a:t>
+            </a:r>
+          </a:p>
+        </p:txBody>
+      </p:sp>
+      <p:sp>
+        <p:nvSpPr>
+          <p:cNvPr id="50" name="TextBox 49">
+            <a:extLst>
+              <a:ext uri="{FF2B5EF4-FFF2-40B4-BE49-F238E27FC236}">
+                <a16:creationId xmlns:a16="http://schemas.microsoft.com/office/drawing/2014/main" id="{B70C0867-6E7C-6837-28C6-E78468C8BED6}"/>
+              </a:ext>
+            </a:extLst>
+          </p:cNvPr>
+          <p:cNvSpPr txBox="1"/>
+          <p:nvPr/>
+        </p:nvSpPr>
+        <p:spPr>
+          <a:xfrm rot="20277280">
+            <a:off x="4387691" y="3343418"/>
+            <a:ext cx="381836" cy="253916"/>
+          </a:xfrm>
+          <a:prstGeom prst="rect">
+            <a:avLst/>
+          </a:prstGeom>
+          <a:noFill/>
+        </p:spPr>
+        <p:txBody>
+          <a:bodyPr wrap="none" rtlCol="0">
+            <a:spAutoFit/>
+          </a:bodyPr>
+          <a:lstStyle/>
+          <a:p>
+            <a:r>
+              <a:rPr lang="en-GB" sz="1050" dirty="0"/>
+              <a:t>i</a:t>
+            </a:r>
+            <a:r>
+              <a:rPr lang="en-DE" sz="1050" dirty="0"/>
+              <a:t>s a</a:t>
+            </a:r>
+          </a:p>
+        </p:txBody>
+      </p:sp>
+      <p:cxnSp>
+        <p:nvCxnSpPr>
+          <p:cNvPr id="51" name="Straight Arrow Connector 50">
+            <a:extLst>
+              <a:ext uri="{FF2B5EF4-FFF2-40B4-BE49-F238E27FC236}">
+                <a16:creationId xmlns:a16="http://schemas.microsoft.com/office/drawing/2014/main" id="{0C561E49-E2AA-661A-CBB7-85C21ED291FB}"/>
+              </a:ext>
+            </a:extLst>
+          </p:cNvPr>
+          <p:cNvCxnSpPr>
+            <a:cxnSpLocks/>
+            <a:stCxn id="30" idx="2"/>
+          </p:cNvCxnSpPr>
+          <p:nvPr/>
+        </p:nvCxnSpPr>
+        <p:spPr>
+          <a:xfrm flipH="1">
+            <a:off x="4071006" y="3312460"/>
+            <a:ext cx="1276441" cy="489656"/>
+          </a:xfrm>
+          <a:prstGeom prst="straightConnector1">
+            <a:avLst/>
+          </a:prstGeom>
+          <a:ln w="19050">
+            <a:tailEnd type="triangle"/>
+          </a:ln>
+        </p:spPr>
+        <p:style>
+          <a:lnRef idx="1">
+            <a:schemeClr val="accent1"/>
+          </a:lnRef>
+          <a:fillRef idx="0">
+            <a:schemeClr val="accent1"/>
+          </a:fillRef>
+          <a:effectRef idx="0">
+            <a:schemeClr val="accent1"/>
+          </a:effectRef>
+          <a:fontRef idx="minor">
+            <a:schemeClr val="tx1"/>
+          </a:fontRef>
+        </p:style>
+      </p:cxnSp>
+      <p:cxnSp>
+        <p:nvCxnSpPr>
+          <p:cNvPr id="52" name="Straight Arrow Connector 51">
+            <a:extLst>
+              <a:ext uri="{FF2B5EF4-FFF2-40B4-BE49-F238E27FC236}">
+                <a16:creationId xmlns:a16="http://schemas.microsoft.com/office/drawing/2014/main" id="{783F0652-7F0B-430B-EB18-7690999A2770}"/>
+              </a:ext>
+            </a:extLst>
+          </p:cNvPr>
+          <p:cNvCxnSpPr>
+            <a:cxnSpLocks/>
+            <a:stCxn id="30" idx="1"/>
+          </p:cNvCxnSpPr>
+          <p:nvPr/>
+        </p:nvCxnSpPr>
+        <p:spPr>
+          <a:xfrm flipH="1" flipV="1">
+            <a:off x="4667041" y="2489955"/>
+            <a:ext cx="868144" cy="369266"/>
+          </a:xfrm>
+          <a:prstGeom prst="straightConnector1">
+            <a:avLst/>
+          </a:prstGeom>
+          <a:ln w="19050">
+            <a:tailEnd type="triangle"/>
+          </a:ln>
+        </p:spPr>
+        <p:style>
+          <a:lnRef idx="1">
+            <a:schemeClr val="accent1"/>
+          </a:lnRef>
+          <a:fillRef idx="0">
+            <a:schemeClr val="accent1"/>
+          </a:fillRef>
+          <a:effectRef idx="0">
+            <a:schemeClr val="accent1"/>
+          </a:effectRef>
+          <a:fontRef idx="minor">
+            <a:schemeClr val="tx1"/>
+          </a:fontRef>
+        </p:style>
+      </p:cxnSp>
+      <p:sp>
+        <p:nvSpPr>
+          <p:cNvPr id="53" name="TextBox 52">
+            <a:extLst>
+              <a:ext uri="{FF2B5EF4-FFF2-40B4-BE49-F238E27FC236}">
+                <a16:creationId xmlns:a16="http://schemas.microsoft.com/office/drawing/2014/main" id="{8064C842-FA99-E7A0-1005-DF67F66AD8DF}"/>
+              </a:ext>
+            </a:extLst>
+          </p:cNvPr>
+          <p:cNvSpPr txBox="1"/>
+          <p:nvPr/>
+        </p:nvSpPr>
+        <p:spPr>
+          <a:xfrm rot="1455518">
+            <a:off x="4839035" y="2436404"/>
+            <a:ext cx="718466" cy="253916"/>
+          </a:xfrm>
+          <a:prstGeom prst="rect">
+            <a:avLst/>
+          </a:prstGeom>
+          <a:noFill/>
+        </p:spPr>
+        <p:txBody>
+          <a:bodyPr wrap="none" rtlCol="0">
+            <a:spAutoFit/>
+          </a:bodyPr>
+          <a:lstStyle/>
+          <a:p>
+            <a:r>
+              <a:rPr lang="en-GB" sz="1050" dirty="0"/>
+              <a:t>h</a:t>
+            </a:r>
+            <a:r>
+              <a:rPr lang="en-DE" sz="1050" dirty="0"/>
+              <a:t>as topic</a:t>
+            </a:r>
+          </a:p>
+        </p:txBody>
+      </p:sp>
+      <p:cxnSp>
+        <p:nvCxnSpPr>
+          <p:cNvPr id="54" name="Straight Arrow Connector 53">
+            <a:extLst>
+              <a:ext uri="{FF2B5EF4-FFF2-40B4-BE49-F238E27FC236}">
+                <a16:creationId xmlns:a16="http://schemas.microsoft.com/office/drawing/2014/main" id="{62C4AFAC-682B-8CEA-8A8F-93ADD6B25F9F}"/>
+              </a:ext>
+            </a:extLst>
+          </p:cNvPr>
+          <p:cNvCxnSpPr>
+            <a:cxnSpLocks/>
+            <a:stCxn id="31" idx="2"/>
+          </p:cNvCxnSpPr>
+          <p:nvPr/>
+        </p:nvCxnSpPr>
+        <p:spPr>
+          <a:xfrm flipH="1" flipV="1">
+            <a:off x="3015592" y="2237279"/>
+            <a:ext cx="499259" cy="21783"/>
+          </a:xfrm>
+          <a:prstGeom prst="straightConnector1">
+            <a:avLst/>
+          </a:prstGeom>
+          <a:ln w="19050">
+            <a:tailEnd type="triangle"/>
+          </a:ln>
+        </p:spPr>
+        <p:style>
+          <a:lnRef idx="1">
+            <a:schemeClr val="accent1"/>
+          </a:lnRef>
+          <a:fillRef idx="0">
+            <a:schemeClr val="accent1"/>
+          </a:fillRef>
+          <a:effectRef idx="0">
+            <a:schemeClr val="accent1"/>
+          </a:effectRef>
+          <a:fontRef idx="minor">
+            <a:schemeClr val="tx1"/>
+          </a:fontRef>
+        </p:style>
+      </p:cxnSp>
+      <p:sp>
+        <p:nvSpPr>
+          <p:cNvPr id="55" name="TextBox 54">
+            <a:extLst>
+              <a:ext uri="{FF2B5EF4-FFF2-40B4-BE49-F238E27FC236}">
+                <a16:creationId xmlns:a16="http://schemas.microsoft.com/office/drawing/2014/main" id="{97761A9E-9ACB-9C7B-5DFF-666CB799AED7}"/>
+              </a:ext>
+            </a:extLst>
+          </p:cNvPr>
+          <p:cNvSpPr txBox="1"/>
+          <p:nvPr/>
+        </p:nvSpPr>
+        <p:spPr>
+          <a:xfrm rot="193132">
+            <a:off x="3110187" y="1986932"/>
+            <a:ext cx="381836" cy="253916"/>
+          </a:xfrm>
+          <a:prstGeom prst="rect">
+            <a:avLst/>
+          </a:prstGeom>
+          <a:noFill/>
+        </p:spPr>
+        <p:txBody>
+          <a:bodyPr wrap="none" rtlCol="0">
+            <a:spAutoFit/>
+          </a:bodyPr>
+          <a:lstStyle/>
+          <a:p>
+            <a:r>
+              <a:rPr lang="en-GB" sz="1050" dirty="0"/>
+              <a:t>i</a:t>
+            </a:r>
+            <a:r>
+              <a:rPr lang="en-DE" sz="1050" dirty="0"/>
+              <a:t>s a</a:t>
+            </a:r>
+          </a:p>
+        </p:txBody>
+      </p:sp>
+    </p:spTree>
+    <p:extLst>
+      <p:ext uri="{BB962C8B-B14F-4D97-AF65-F5344CB8AC3E}">
+        <p14:creationId xmlns:p14="http://schemas.microsoft.com/office/powerpoint/2010/main" val="3372257454"/>
+      </p:ext>
+    </p:extLst>
+  </p:cSld>
+  <p:clrMapOvr>
+    <a:masterClrMapping/>
+  </p:clrMapOvr>
+</p:sld>
+</file>
+
+<file path=ppt/slides/slide11.xml><?xml version="1.0" encoding="utf-8"?>
+<p:sld xmlns:a="http://schemas.openxmlformats.org/drawingml/2006/main" xmlns:r="http://schemas.openxmlformats.org/officeDocument/2006/relationships" xmlns:p="http://schemas.openxmlformats.org/presentationml/2006/main">
+  <p:cSld>
+    <p:spTree>
+      <p:nvGrpSpPr>
+        <p:cNvPr id="1" name=""/>
+        <p:cNvGrpSpPr/>
+        <p:nvPr/>
+      </p:nvGrpSpPr>
+      <p:grpSpPr>
+        <a:xfrm>
+          <a:off x="0" y="0"/>
+          <a:ext cx="0" cy="0"/>
+          <a:chOff x="0" y="0"/>
+          <a:chExt cx="0" cy="0"/>
+        </a:xfrm>
+      </p:grpSpPr>
+      <p:sp>
+        <p:nvSpPr>
+          <p:cNvPr id="2" name="Rectangle 1">
+            <a:extLst>
+              <a:ext uri="{FF2B5EF4-FFF2-40B4-BE49-F238E27FC236}">
+                <a16:creationId xmlns:a16="http://schemas.microsoft.com/office/drawing/2014/main" id="{BB53F655-DE22-BCE6-028F-3F76AC73F68E}"/>
+              </a:ext>
+            </a:extLst>
+          </p:cNvPr>
+          <p:cNvSpPr/>
+          <p:nvPr/>
+        </p:nvSpPr>
+        <p:spPr>
+          <a:xfrm>
+            <a:off x="1332753" y="2755152"/>
+            <a:ext cx="2563906" cy="1243105"/>
+          </a:xfrm>
+          <a:custGeom>
+            <a:avLst/>
+            <a:gdLst>
+              <a:gd name="connsiteX0" fmla="*/ 0 w 2563906"/>
+              <a:gd name="connsiteY0" fmla="*/ 0 h 1243105"/>
+              <a:gd name="connsiteX1" fmla="*/ 2563906 w 2563906"/>
+              <a:gd name="connsiteY1" fmla="*/ 0 h 1243105"/>
+              <a:gd name="connsiteX2" fmla="*/ 2563906 w 2563906"/>
+              <a:gd name="connsiteY2" fmla="*/ 1243105 h 1243105"/>
+              <a:gd name="connsiteX3" fmla="*/ 0 w 2563906"/>
+              <a:gd name="connsiteY3" fmla="*/ 1243105 h 1243105"/>
+              <a:gd name="connsiteX4" fmla="*/ 0 w 2563906"/>
+              <a:gd name="connsiteY4" fmla="*/ 0 h 1243105"/>
+            </a:gdLst>
+            <a:ahLst/>
+            <a:cxnLst>
+              <a:cxn ang="0">
+                <a:pos x="connsiteX0" y="connsiteY0"/>
+              </a:cxn>
+              <a:cxn ang="0">
+                <a:pos x="connsiteX1" y="connsiteY1"/>
+              </a:cxn>
+              <a:cxn ang="0">
+                <a:pos x="connsiteX2" y="connsiteY2"/>
+              </a:cxn>
+              <a:cxn ang="0">
+                <a:pos x="connsiteX3" y="connsiteY3"/>
+              </a:cxn>
+              <a:cxn ang="0">
+                <a:pos x="connsiteX4" y="connsiteY4"/>
+              </a:cxn>
+            </a:cxnLst>
+            <a:rect l="l" t="t" r="r" b="b"/>
+            <a:pathLst>
+              <a:path w="2563906" h="1243105" extrusionOk="0">
+                <a:moveTo>
+                  <a:pt x="0" y="0"/>
+                </a:moveTo>
+                <a:cubicBezTo>
+                  <a:pt x="1137707" y="118645"/>
+                  <a:pt x="1288717" y="116012"/>
+                  <a:pt x="2563906" y="0"/>
+                </a:cubicBezTo>
+                <a:cubicBezTo>
+                  <a:pt x="2590609" y="283609"/>
+                  <a:pt x="2567571" y="731905"/>
+                  <a:pt x="2563906" y="1243105"/>
+                </a:cubicBezTo>
+                <a:cubicBezTo>
+                  <a:pt x="1412061" y="1377705"/>
+                  <a:pt x="936386" y="1085909"/>
+                  <a:pt x="0" y="1243105"/>
+                </a:cubicBezTo>
+                <a:cubicBezTo>
+                  <a:pt x="61265" y="976335"/>
+                  <a:pt x="30021" y="319134"/>
+                  <a:pt x="0" y="0"/>
+                </a:cubicBezTo>
+                <a:close/>
+              </a:path>
+            </a:pathLst>
+          </a:custGeom>
+          <a:noFill/>
+          <a:ln>
+            <a:extLst>
+              <a:ext uri="{C807C97D-BFC1-408E-A445-0C87EB9F89A2}">
+                <ask:lineSketchStyleProps xmlns:ask="http://schemas.microsoft.com/office/drawing/2018/sketchyshapes" sd="1219033472">
+                  <a:prstGeom prst="rect">
+                    <a:avLst/>
+                  </a:prstGeom>
+                  <ask:type>
+                    <ask:lineSketchCurved/>
+                  </ask:type>
+                </ask:lineSketchStyleProps>
+              </a:ext>
+            </a:extLst>
+          </a:ln>
+        </p:spPr>
+        <p:style>
+          <a:lnRef idx="2">
+            <a:schemeClr val="accent1">
+              <a:shade val="15000"/>
+            </a:schemeClr>
+          </a:lnRef>
+          <a:fillRef idx="1">
+            <a:schemeClr val="accent1"/>
+          </a:fillRef>
+          <a:effectRef idx="0">
+            <a:schemeClr val="accent1"/>
+          </a:effectRef>
+          <a:fontRef idx="minor">
+            <a:schemeClr val="lt1"/>
+          </a:fontRef>
+        </p:style>
+        <p:txBody>
+          <a:bodyPr rtlCol="0" anchor="ctr"/>
+          <a:lstStyle/>
+          <a:p>
+            <a:pPr algn="ctr"/>
+            <a:endParaRPr lang="en-DE"/>
+          </a:p>
+        </p:txBody>
+      </p:sp>
+      <p:sp>
+        <p:nvSpPr>
+          <p:cNvPr id="3" name="Rectangle 2">
+            <a:extLst>
+              <a:ext uri="{FF2B5EF4-FFF2-40B4-BE49-F238E27FC236}">
+                <a16:creationId xmlns:a16="http://schemas.microsoft.com/office/drawing/2014/main" id="{4ADC676D-1D59-5856-6F49-2F424EBBBC4F}"/>
+              </a:ext>
+            </a:extLst>
+          </p:cNvPr>
+          <p:cNvSpPr/>
+          <p:nvPr/>
+        </p:nvSpPr>
+        <p:spPr>
+          <a:xfrm>
+            <a:off x="7679764" y="2755150"/>
+            <a:ext cx="2563906" cy="1243105"/>
+          </a:xfrm>
+          <a:custGeom>
+            <a:avLst/>
+            <a:gdLst>
+              <a:gd name="connsiteX0" fmla="*/ 0 w 2563906"/>
+              <a:gd name="connsiteY0" fmla="*/ 0 h 1243105"/>
+              <a:gd name="connsiteX1" fmla="*/ 2563906 w 2563906"/>
+              <a:gd name="connsiteY1" fmla="*/ 0 h 1243105"/>
+              <a:gd name="connsiteX2" fmla="*/ 2563906 w 2563906"/>
+              <a:gd name="connsiteY2" fmla="*/ 1243105 h 1243105"/>
+              <a:gd name="connsiteX3" fmla="*/ 0 w 2563906"/>
+              <a:gd name="connsiteY3" fmla="*/ 1243105 h 1243105"/>
+              <a:gd name="connsiteX4" fmla="*/ 0 w 2563906"/>
+              <a:gd name="connsiteY4" fmla="*/ 0 h 1243105"/>
+            </a:gdLst>
+            <a:ahLst/>
+            <a:cxnLst>
+              <a:cxn ang="0">
+                <a:pos x="connsiteX0" y="connsiteY0"/>
+              </a:cxn>
+              <a:cxn ang="0">
+                <a:pos x="connsiteX1" y="connsiteY1"/>
+              </a:cxn>
+              <a:cxn ang="0">
+                <a:pos x="connsiteX2" y="connsiteY2"/>
+              </a:cxn>
+              <a:cxn ang="0">
+                <a:pos x="connsiteX3" y="connsiteY3"/>
+              </a:cxn>
+              <a:cxn ang="0">
+                <a:pos x="connsiteX4" y="connsiteY4"/>
+              </a:cxn>
+            </a:cxnLst>
+            <a:rect l="l" t="t" r="r" b="b"/>
+            <a:pathLst>
+              <a:path w="2563906" h="1243105" extrusionOk="0">
+                <a:moveTo>
+                  <a:pt x="0" y="0"/>
+                </a:moveTo>
+                <a:cubicBezTo>
+                  <a:pt x="1137707" y="118645"/>
+                  <a:pt x="1288717" y="116012"/>
+                  <a:pt x="2563906" y="0"/>
+                </a:cubicBezTo>
+                <a:cubicBezTo>
+                  <a:pt x="2590609" y="283609"/>
+                  <a:pt x="2567571" y="731905"/>
+                  <a:pt x="2563906" y="1243105"/>
+                </a:cubicBezTo>
+                <a:cubicBezTo>
+                  <a:pt x="1412061" y="1377705"/>
+                  <a:pt x="936386" y="1085909"/>
+                  <a:pt x="0" y="1243105"/>
+                </a:cubicBezTo>
+                <a:cubicBezTo>
+                  <a:pt x="61265" y="976335"/>
+                  <a:pt x="30021" y="319134"/>
+                  <a:pt x="0" y="0"/>
+                </a:cubicBezTo>
+                <a:close/>
+              </a:path>
+            </a:pathLst>
+          </a:custGeom>
+          <a:noFill/>
+          <a:ln>
+            <a:extLst>
+              <a:ext uri="{C807C97D-BFC1-408E-A445-0C87EB9F89A2}">
+                <ask:lineSketchStyleProps xmlns:ask="http://schemas.microsoft.com/office/drawing/2018/sketchyshapes" sd="1219033472">
+                  <a:prstGeom prst="rect">
+                    <a:avLst/>
+                  </a:prstGeom>
+                  <ask:type>
+                    <ask:lineSketchCurved/>
+                  </ask:type>
+                </ask:lineSketchStyleProps>
+              </a:ext>
+            </a:extLst>
+          </a:ln>
+        </p:spPr>
+        <p:style>
+          <a:lnRef idx="2">
+            <a:schemeClr val="accent1">
+              <a:shade val="15000"/>
+            </a:schemeClr>
+          </a:lnRef>
+          <a:fillRef idx="1">
+            <a:schemeClr val="accent1"/>
+          </a:fillRef>
+          <a:effectRef idx="0">
+            <a:schemeClr val="accent1"/>
+          </a:effectRef>
+          <a:fontRef idx="minor">
+            <a:schemeClr val="lt1"/>
+          </a:fontRef>
+        </p:style>
+        <p:txBody>
+          <a:bodyPr rtlCol="0" anchor="ctr"/>
+          <a:lstStyle/>
+          <a:p>
+            <a:pPr algn="ctr"/>
+            <a:endParaRPr lang="en-DE"/>
+          </a:p>
+        </p:txBody>
+      </p:sp>
+      <p:sp>
+        <p:nvSpPr>
+          <p:cNvPr id="4" name="Rectangle 3">
+            <a:extLst>
+              <a:ext uri="{FF2B5EF4-FFF2-40B4-BE49-F238E27FC236}">
+                <a16:creationId xmlns:a16="http://schemas.microsoft.com/office/drawing/2014/main" id="{840C64C1-36AB-69F6-7942-80432A0C1AF2}"/>
+              </a:ext>
+            </a:extLst>
+          </p:cNvPr>
+          <p:cNvSpPr/>
+          <p:nvPr/>
+        </p:nvSpPr>
+        <p:spPr>
+          <a:xfrm>
+            <a:off x="4506259" y="2755151"/>
+            <a:ext cx="2563906" cy="1243105"/>
+          </a:xfrm>
+          <a:custGeom>
+            <a:avLst/>
+            <a:gdLst>
+              <a:gd name="connsiteX0" fmla="*/ 0 w 2563906"/>
+              <a:gd name="connsiteY0" fmla="*/ 0 h 1243105"/>
+              <a:gd name="connsiteX1" fmla="*/ 2563906 w 2563906"/>
+              <a:gd name="connsiteY1" fmla="*/ 0 h 1243105"/>
+              <a:gd name="connsiteX2" fmla="*/ 2563906 w 2563906"/>
+              <a:gd name="connsiteY2" fmla="*/ 1243105 h 1243105"/>
+              <a:gd name="connsiteX3" fmla="*/ 0 w 2563906"/>
+              <a:gd name="connsiteY3" fmla="*/ 1243105 h 1243105"/>
+              <a:gd name="connsiteX4" fmla="*/ 0 w 2563906"/>
+              <a:gd name="connsiteY4" fmla="*/ 0 h 1243105"/>
+            </a:gdLst>
+            <a:ahLst/>
+            <a:cxnLst>
+              <a:cxn ang="0">
+                <a:pos x="connsiteX0" y="connsiteY0"/>
+              </a:cxn>
+              <a:cxn ang="0">
+                <a:pos x="connsiteX1" y="connsiteY1"/>
+              </a:cxn>
+              <a:cxn ang="0">
+                <a:pos x="connsiteX2" y="connsiteY2"/>
+              </a:cxn>
+              <a:cxn ang="0">
+                <a:pos x="connsiteX3" y="connsiteY3"/>
+              </a:cxn>
+              <a:cxn ang="0">
+                <a:pos x="connsiteX4" y="connsiteY4"/>
+              </a:cxn>
+            </a:cxnLst>
+            <a:rect l="l" t="t" r="r" b="b"/>
+            <a:pathLst>
+              <a:path w="2563906" h="1243105" extrusionOk="0">
+                <a:moveTo>
+                  <a:pt x="0" y="0"/>
+                </a:moveTo>
+                <a:cubicBezTo>
+                  <a:pt x="1137707" y="118645"/>
+                  <a:pt x="1288717" y="116012"/>
+                  <a:pt x="2563906" y="0"/>
+                </a:cubicBezTo>
+                <a:cubicBezTo>
+                  <a:pt x="2590609" y="283609"/>
+                  <a:pt x="2567571" y="731905"/>
+                  <a:pt x="2563906" y="1243105"/>
+                </a:cubicBezTo>
+                <a:cubicBezTo>
+                  <a:pt x="1412061" y="1377705"/>
+                  <a:pt x="936386" y="1085909"/>
+                  <a:pt x="0" y="1243105"/>
+                </a:cubicBezTo>
+                <a:cubicBezTo>
+                  <a:pt x="61265" y="976335"/>
+                  <a:pt x="30021" y="319134"/>
+                  <a:pt x="0" y="0"/>
+                </a:cubicBezTo>
+                <a:close/>
+              </a:path>
+            </a:pathLst>
+          </a:custGeom>
+          <a:noFill/>
+          <a:ln>
+            <a:extLst>
+              <a:ext uri="{C807C97D-BFC1-408E-A445-0C87EB9F89A2}">
+                <ask:lineSketchStyleProps xmlns:ask="http://schemas.microsoft.com/office/drawing/2018/sketchyshapes" sd="1219033472">
+                  <a:prstGeom prst="rect">
+                    <a:avLst/>
+                  </a:prstGeom>
+                  <ask:type>
+                    <ask:lineSketchCurved/>
+                  </ask:type>
+                </ask:lineSketchStyleProps>
+              </a:ext>
+            </a:extLst>
+          </a:ln>
+        </p:spPr>
+        <p:style>
+          <a:lnRef idx="2">
+            <a:schemeClr val="accent1">
+              <a:shade val="15000"/>
+            </a:schemeClr>
+          </a:lnRef>
+          <a:fillRef idx="1">
+            <a:schemeClr val="accent1"/>
+          </a:fillRef>
+          <a:effectRef idx="0">
+            <a:schemeClr val="accent1"/>
+          </a:effectRef>
+          <a:fontRef idx="minor">
+            <a:schemeClr val="lt1"/>
+          </a:fontRef>
+        </p:style>
+        <p:txBody>
+          <a:bodyPr rtlCol="0" anchor="ctr"/>
+          <a:lstStyle/>
+          <a:p>
+            <a:pPr algn="ctr"/>
+            <a:endParaRPr lang="en-DE"/>
+          </a:p>
+        </p:txBody>
+      </p:sp>
+      <p:sp>
+        <p:nvSpPr>
+          <p:cNvPr id="5" name="TextBox 4">
+            <a:extLst>
+              <a:ext uri="{FF2B5EF4-FFF2-40B4-BE49-F238E27FC236}">
+                <a16:creationId xmlns:a16="http://schemas.microsoft.com/office/drawing/2014/main" id="{68F1463D-C367-FB2E-B63B-DA10E6CD69B4}"/>
+              </a:ext>
+            </a:extLst>
+          </p:cNvPr>
+          <p:cNvSpPr txBox="1"/>
+          <p:nvPr/>
+        </p:nvSpPr>
+        <p:spPr>
+          <a:xfrm>
+            <a:off x="2336296" y="2874682"/>
+            <a:ext cx="556819" cy="369332"/>
+          </a:xfrm>
+          <a:prstGeom prst="rect">
+            <a:avLst/>
+          </a:prstGeom>
+          <a:noFill/>
+        </p:spPr>
+        <p:txBody>
+          <a:bodyPr wrap="none" rtlCol="0">
+            <a:spAutoFit/>
+          </a:bodyPr>
+          <a:lstStyle/>
+          <a:p>
+            <a:r>
+              <a:rPr lang="en-DE" dirty="0"/>
+              <a:t>Foo</a:t>
+            </a:r>
+          </a:p>
+        </p:txBody>
+      </p:sp>
+      <p:sp>
+        <p:nvSpPr>
+          <p:cNvPr id="6" name="TextBox 5">
+            <a:extLst>
+              <a:ext uri="{FF2B5EF4-FFF2-40B4-BE49-F238E27FC236}">
+                <a16:creationId xmlns:a16="http://schemas.microsoft.com/office/drawing/2014/main" id="{DB07E3DF-8558-0F99-ECE3-6AA343121389}"/>
+              </a:ext>
+            </a:extLst>
+          </p:cNvPr>
+          <p:cNvSpPr txBox="1"/>
+          <p:nvPr/>
+        </p:nvSpPr>
+        <p:spPr>
+          <a:xfrm>
+            <a:off x="5504329" y="2874682"/>
+            <a:ext cx="524503" cy="369332"/>
+          </a:xfrm>
+          <a:prstGeom prst="rect">
+            <a:avLst/>
+          </a:prstGeom>
+          <a:noFill/>
+        </p:spPr>
+        <p:txBody>
+          <a:bodyPr wrap="none" rtlCol="0">
+            <a:spAutoFit/>
+          </a:bodyPr>
+          <a:lstStyle/>
+          <a:p>
+            <a:r>
+              <a:rPr lang="en-DE" dirty="0"/>
+              <a:t>Bar</a:t>
+            </a:r>
+          </a:p>
+        </p:txBody>
+      </p:sp>
+      <p:sp>
+        <p:nvSpPr>
+          <p:cNvPr id="7" name="TextBox 6">
+            <a:extLst>
+              <a:ext uri="{FF2B5EF4-FFF2-40B4-BE49-F238E27FC236}">
+                <a16:creationId xmlns:a16="http://schemas.microsoft.com/office/drawing/2014/main" id="{C2AF722A-323E-A035-49C9-94B6543F33AC}"/>
+              </a:ext>
+            </a:extLst>
+          </p:cNvPr>
+          <p:cNvSpPr txBox="1"/>
+          <p:nvPr/>
+        </p:nvSpPr>
+        <p:spPr>
+          <a:xfrm>
+            <a:off x="8699466" y="2874682"/>
+            <a:ext cx="591829" cy="369332"/>
+          </a:xfrm>
+          <a:prstGeom prst="rect">
+            <a:avLst/>
+          </a:prstGeom>
+          <a:noFill/>
+        </p:spPr>
+        <p:txBody>
+          <a:bodyPr wrap="none" rtlCol="0">
+            <a:spAutoFit/>
+          </a:bodyPr>
+          <a:lstStyle/>
+          <a:p>
+            <a:r>
+              <a:rPr lang="en-DE" dirty="0"/>
+              <a:t>Doe</a:t>
+            </a:r>
+          </a:p>
+        </p:txBody>
+      </p:sp>
+      <p:sp>
+        <p:nvSpPr>
+          <p:cNvPr id="8" name="Rectangle 7">
+            <a:extLst>
+              <a:ext uri="{FF2B5EF4-FFF2-40B4-BE49-F238E27FC236}">
+                <a16:creationId xmlns:a16="http://schemas.microsoft.com/office/drawing/2014/main" id="{2D0DDFD6-D868-BBEB-1541-83F57792E770}"/>
+              </a:ext>
+            </a:extLst>
+          </p:cNvPr>
+          <p:cNvSpPr/>
+          <p:nvPr/>
+        </p:nvSpPr>
+        <p:spPr>
+          <a:xfrm>
+            <a:off x="1598707" y="3287058"/>
+            <a:ext cx="2032000" cy="466165"/>
+          </a:xfrm>
+          <a:prstGeom prst="rect">
+            <a:avLst/>
+          </a:prstGeom>
+          <a:noFill/>
+        </p:spPr>
+        <p:style>
+          <a:lnRef idx="2">
+            <a:schemeClr val="accent1">
+              <a:shade val="15000"/>
+            </a:schemeClr>
+          </a:lnRef>
+          <a:fillRef idx="1">
+            <a:schemeClr val="accent1"/>
+          </a:fillRef>
+          <a:effectRef idx="0">
+            <a:schemeClr val="accent1"/>
+          </a:effectRef>
+          <a:fontRef idx="minor">
+            <a:schemeClr val="lt1"/>
+          </a:fontRef>
+        </p:style>
+        <p:txBody>
+          <a:bodyPr rtlCol="0" anchor="ctr"/>
+          <a:lstStyle/>
+          <a:p>
+            <a:pPr algn="ctr"/>
+            <a:r>
+              <a:rPr lang="en-DE" dirty="0">
+                <a:solidFill>
+                  <a:schemeClr val="tx1"/>
+                </a:solidFill>
+              </a:rPr>
+              <a:t>”Hello World”</a:t>
+            </a:r>
+          </a:p>
+        </p:txBody>
+      </p:sp>
+      <p:sp>
+        <p:nvSpPr>
+          <p:cNvPr id="9" name="Rectangle 8">
+            <a:extLst>
+              <a:ext uri="{FF2B5EF4-FFF2-40B4-BE49-F238E27FC236}">
+                <a16:creationId xmlns:a16="http://schemas.microsoft.com/office/drawing/2014/main" id="{E6A1E52C-2BBA-48A0-4476-A90FB818FAAD}"/>
+              </a:ext>
+            </a:extLst>
+          </p:cNvPr>
+          <p:cNvSpPr/>
+          <p:nvPr/>
+        </p:nvSpPr>
+        <p:spPr>
+          <a:xfrm>
+            <a:off x="4772212" y="3287058"/>
+            <a:ext cx="2032000" cy="466165"/>
+          </a:xfrm>
+          <a:prstGeom prst="rect">
+            <a:avLst/>
+          </a:prstGeom>
+          <a:noFill/>
+        </p:spPr>
+        <p:style>
+          <a:lnRef idx="2">
+            <a:schemeClr val="accent1">
+              <a:shade val="15000"/>
+            </a:schemeClr>
+          </a:lnRef>
+          <a:fillRef idx="1">
+            <a:schemeClr val="accent1"/>
+          </a:fillRef>
+          <a:effectRef idx="0">
+            <a:schemeClr val="accent1"/>
+          </a:effectRef>
+          <a:fontRef idx="minor">
+            <a:schemeClr val="lt1"/>
+          </a:fontRef>
+        </p:style>
+        <p:txBody>
+          <a:bodyPr rtlCol="0" anchor="ctr"/>
+          <a:lstStyle/>
+          <a:p>
+            <a:pPr algn="ctr"/>
+            <a:r>
+              <a:rPr lang="en-DE" dirty="0">
+                <a:solidFill>
+                  <a:schemeClr val="tx1"/>
+                </a:solidFill>
+              </a:rPr>
+              <a:t>123</a:t>
+            </a:r>
+          </a:p>
+        </p:txBody>
+      </p:sp>
+      <p:sp>
+        <p:nvSpPr>
+          <p:cNvPr id="10" name="Rectangle 9">
+            <a:extLst>
+              <a:ext uri="{FF2B5EF4-FFF2-40B4-BE49-F238E27FC236}">
+                <a16:creationId xmlns:a16="http://schemas.microsoft.com/office/drawing/2014/main" id="{DF7C2FAD-0BC1-4D31-0C5F-4D15714279D1}"/>
+              </a:ext>
+            </a:extLst>
+          </p:cNvPr>
+          <p:cNvSpPr/>
+          <p:nvPr/>
+        </p:nvSpPr>
+        <p:spPr>
+          <a:xfrm>
+            <a:off x="7945717" y="3287058"/>
+            <a:ext cx="2032000" cy="466165"/>
+          </a:xfrm>
+          <a:prstGeom prst="rect">
+            <a:avLst/>
+          </a:prstGeom>
+          <a:noFill/>
+        </p:spPr>
+        <p:style>
+          <a:lnRef idx="2">
+            <a:schemeClr val="accent1">
+              <a:shade val="15000"/>
+            </a:schemeClr>
+          </a:lnRef>
+          <a:fillRef idx="1">
+            <a:schemeClr val="accent1"/>
+          </a:fillRef>
+          <a:effectRef idx="0">
+            <a:schemeClr val="accent1"/>
+          </a:effectRef>
+          <a:fontRef idx="minor">
+            <a:schemeClr val="lt1"/>
+          </a:fontRef>
+        </p:style>
+        <p:txBody>
+          <a:bodyPr rtlCol="0" anchor="ctr"/>
+          <a:lstStyle/>
+          <a:p>
+            <a:pPr algn="ctr"/>
+            <a:r>
+              <a:rPr lang="en-DE" dirty="0">
+                <a:solidFill>
+                  <a:schemeClr val="tx1"/>
+                </a:solidFill>
+              </a:rPr>
+              <a:t>123.45</a:t>
+            </a:r>
+          </a:p>
+        </p:txBody>
+      </p:sp>
+    </p:spTree>
+    <p:extLst>
+      <p:ext uri="{BB962C8B-B14F-4D97-AF65-F5344CB8AC3E}">
+        <p14:creationId xmlns:p14="http://schemas.microsoft.com/office/powerpoint/2010/main" val="2612272279"/>
+      </p:ext>
+    </p:extLst>
+  </p:cSld>
+  <p:clrMapOvr>
+    <a:masterClrMapping/>
+  </p:clrMapOvr>
+</p:sld>
+</file>
+
 <file path=ppt/slides/slide2.xml><?xml version="1.0" encoding="utf-8"?>
 <p:sld xmlns:a="http://schemas.openxmlformats.org/drawingml/2006/main" xmlns:r="http://schemas.openxmlformats.org/officeDocument/2006/relationships" xmlns:p="http://schemas.openxmlformats.org/presentationml/2006/main">
   <p:cSld>
@@ -10466,8 +12101,8 @@
         </p:blipFill>
         <p:spPr>
           <a:xfrm>
-            <a:off x="1943100" y="3048000"/>
-            <a:ext cx="1854200" cy="1854200"/>
+            <a:off x="2870200" y="3048000"/>
+            <a:ext cx="1397000" cy="1397000"/>
           </a:xfrm>
           <a:prstGeom prst="rect">
             <a:avLst/>
@@ -10488,7 +12123,7 @@
         </p:nvSpPr>
         <p:spPr>
           <a:xfrm>
-            <a:off x="2318478" y="2678668"/>
+            <a:off x="3016978" y="2678668"/>
             <a:ext cx="1103444" cy="369332"/>
           </a:xfrm>
           <a:prstGeom prst="rect">
@@ -10523,7 +12158,7 @@
         </p:nvSpPr>
         <p:spPr>
           <a:xfrm>
-            <a:off x="2286258" y="4902200"/>
+            <a:off x="2952538" y="4539734"/>
             <a:ext cx="1167884" cy="369332"/>
           </a:xfrm>
           <a:prstGeom prst="rect">
@@ -10572,8 +12207,8 @@
         </p:blipFill>
         <p:spPr>
           <a:xfrm>
-            <a:off x="3829520" y="3048000"/>
-            <a:ext cx="1854200" cy="1854200"/>
+            <a:off x="4319456" y="3048000"/>
+            <a:ext cx="1397000" cy="1397000"/>
           </a:xfrm>
           <a:prstGeom prst="rect">
             <a:avLst/>
@@ -10594,7 +12229,7 @@
         </p:nvSpPr>
         <p:spPr>
           <a:xfrm>
-            <a:off x="4204898" y="2678668"/>
+            <a:off x="4463054" y="2678668"/>
             <a:ext cx="1103444" cy="369332"/>
           </a:xfrm>
           <a:prstGeom prst="rect">
@@ -10629,7 +12264,7 @@
         </p:nvSpPr>
         <p:spPr>
           <a:xfrm>
-            <a:off x="4172678" y="4902200"/>
+            <a:off x="4398614" y="4539734"/>
             <a:ext cx="1167884" cy="369332"/>
           </a:xfrm>
           <a:prstGeom prst="rect">
@@ -10678,8 +12313,8 @@
         </p:blipFill>
         <p:spPr>
           <a:xfrm>
-            <a:off x="5683720" y="3048000"/>
-            <a:ext cx="1854200" cy="1854200"/>
+            <a:off x="5684236" y="3048000"/>
+            <a:ext cx="1397000" cy="1397000"/>
           </a:xfrm>
           <a:prstGeom prst="rect">
             <a:avLst/>
@@ -10700,7 +12335,7 @@
         </p:nvSpPr>
         <p:spPr>
           <a:xfrm>
-            <a:off x="6059098" y="2678668"/>
+            <a:off x="5831014" y="2700635"/>
             <a:ext cx="1103444" cy="369332"/>
           </a:xfrm>
           <a:prstGeom prst="rect">
@@ -10735,7 +12370,7 @@
         </p:nvSpPr>
         <p:spPr>
           <a:xfrm>
-            <a:off x="6026878" y="4902200"/>
+            <a:off x="5831014" y="4532868"/>
             <a:ext cx="1167884" cy="369332"/>
           </a:xfrm>
           <a:prstGeom prst="rect">
@@ -10784,8 +12419,8 @@
         </p:blipFill>
         <p:spPr>
           <a:xfrm>
-            <a:off x="7537920" y="3048000"/>
-            <a:ext cx="1854200" cy="1854200"/>
+            <a:off x="7081236" y="3048000"/>
+            <a:ext cx="1397000" cy="1397000"/>
           </a:xfrm>
           <a:prstGeom prst="rect">
             <a:avLst/>
@@ -10806,7 +12441,7 @@
         </p:nvSpPr>
         <p:spPr>
           <a:xfrm>
-            <a:off x="7913298" y="2678668"/>
+            <a:off x="7228014" y="2690336"/>
             <a:ext cx="1103444" cy="369332"/>
           </a:xfrm>
           <a:prstGeom prst="rect">
@@ -10841,7 +12476,7 @@
         </p:nvSpPr>
         <p:spPr>
           <a:xfrm>
-            <a:off x="7881078" y="4902200"/>
+            <a:off x="7228014" y="4488934"/>
             <a:ext cx="1167884" cy="369332"/>
           </a:xfrm>
           <a:prstGeom prst="rect">
@@ -10911,7 +12546,7 @@
         </p:nvSpPr>
         <p:spPr>
           <a:xfrm>
-            <a:off x="5131998" y="5596930"/>
+            <a:off x="5147293" y="5139730"/>
             <a:ext cx="1138325" cy="369332"/>
           </a:xfrm>
           <a:prstGeom prst="rect">
@@ -10964,6 +12599,387 @@
       </p:grpSpPr>
       <p:sp>
         <p:nvSpPr>
+          <p:cNvPr id="9" name="TextBox 8">
+            <a:extLst>
+              <a:ext uri="{FF2B5EF4-FFF2-40B4-BE49-F238E27FC236}">
+                <a16:creationId xmlns:a16="http://schemas.microsoft.com/office/drawing/2014/main" id="{8324DA46-BFBE-A1BC-0033-E14221BA76A5}"/>
+              </a:ext>
+            </a:extLst>
+          </p:cNvPr>
+          <p:cNvSpPr txBox="1"/>
+          <p:nvPr/>
+        </p:nvSpPr>
+        <p:spPr>
+          <a:xfrm>
+            <a:off x="1453164" y="1932801"/>
+            <a:ext cx="1103444" cy="369332"/>
+          </a:xfrm>
+          <a:prstGeom prst="rect">
+            <a:avLst/>
+          </a:prstGeom>
+          <a:noFill/>
+        </p:spPr>
+        <p:txBody>
+          <a:bodyPr wrap="none" rtlCol="0">
+            <a:spAutoFit/>
+          </a:bodyPr>
+          <a:lstStyle/>
+          <a:p>
+            <a:r>
+              <a:rPr lang="en-DE" dirty="0"/>
+              <a:t>&lt;guest1&gt;</a:t>
+            </a:r>
+          </a:p>
+        </p:txBody>
+      </p:sp>
+      <p:sp>
+        <p:nvSpPr>
+          <p:cNvPr id="13" name="TextBox 12">
+            <a:extLst>
+              <a:ext uri="{FF2B5EF4-FFF2-40B4-BE49-F238E27FC236}">
+                <a16:creationId xmlns:a16="http://schemas.microsoft.com/office/drawing/2014/main" id="{1E03F521-DFA7-D806-11B2-F3B05406C14B}"/>
+              </a:ext>
+            </a:extLst>
+          </p:cNvPr>
+          <p:cNvSpPr txBox="1"/>
+          <p:nvPr/>
+        </p:nvSpPr>
+        <p:spPr>
+          <a:xfrm>
+            <a:off x="2899240" y="1932801"/>
+            <a:ext cx="1103444" cy="369332"/>
+          </a:xfrm>
+          <a:prstGeom prst="rect">
+            <a:avLst/>
+          </a:prstGeom>
+          <a:noFill/>
+        </p:spPr>
+        <p:txBody>
+          <a:bodyPr wrap="none" rtlCol="0">
+            <a:spAutoFit/>
+          </a:bodyPr>
+          <a:lstStyle/>
+          <a:p>
+            <a:r>
+              <a:rPr lang="en-DE" dirty="0"/>
+              <a:t>&lt;guest2&gt;</a:t>
+            </a:r>
+          </a:p>
+        </p:txBody>
+      </p:sp>
+      <p:sp>
+        <p:nvSpPr>
+          <p:cNvPr id="17" name="TextBox 16">
+            <a:extLst>
+              <a:ext uri="{FF2B5EF4-FFF2-40B4-BE49-F238E27FC236}">
+                <a16:creationId xmlns:a16="http://schemas.microsoft.com/office/drawing/2014/main" id="{49C9E987-FC80-DF73-1916-3D57009995F9}"/>
+              </a:ext>
+            </a:extLst>
+          </p:cNvPr>
+          <p:cNvSpPr txBox="1"/>
+          <p:nvPr/>
+        </p:nvSpPr>
+        <p:spPr>
+          <a:xfrm>
+            <a:off x="4267200" y="1954768"/>
+            <a:ext cx="1103444" cy="369332"/>
+          </a:xfrm>
+          <a:prstGeom prst="rect">
+            <a:avLst/>
+          </a:prstGeom>
+          <a:noFill/>
+        </p:spPr>
+        <p:txBody>
+          <a:bodyPr wrap="none" rtlCol="0">
+            <a:spAutoFit/>
+          </a:bodyPr>
+          <a:lstStyle/>
+          <a:p>
+            <a:r>
+              <a:rPr lang="en-DE" dirty="0"/>
+              <a:t>&lt;guest3&gt;</a:t>
+            </a:r>
+          </a:p>
+        </p:txBody>
+      </p:sp>
+      <p:sp>
+        <p:nvSpPr>
+          <p:cNvPr id="24" name="TextBox 23">
+            <a:extLst>
+              <a:ext uri="{FF2B5EF4-FFF2-40B4-BE49-F238E27FC236}">
+                <a16:creationId xmlns:a16="http://schemas.microsoft.com/office/drawing/2014/main" id="{069AF07C-9D51-EAC5-0337-4A40416AC950}"/>
+              </a:ext>
+            </a:extLst>
+          </p:cNvPr>
+          <p:cNvSpPr txBox="1"/>
+          <p:nvPr/>
+        </p:nvSpPr>
+        <p:spPr>
+          <a:xfrm>
+            <a:off x="5664200" y="1944469"/>
+            <a:ext cx="1103444" cy="369332"/>
+          </a:xfrm>
+          <a:prstGeom prst="rect">
+            <a:avLst/>
+          </a:prstGeom>
+          <a:noFill/>
+        </p:spPr>
+        <p:txBody>
+          <a:bodyPr wrap="none" rtlCol="0">
+            <a:spAutoFit/>
+          </a:bodyPr>
+          <a:lstStyle/>
+          <a:p>
+            <a:r>
+              <a:rPr lang="en-DE" dirty="0"/>
+              <a:t>&lt;guest4&gt;</a:t>
+            </a:r>
+          </a:p>
+        </p:txBody>
+      </p:sp>
+      <p:sp>
+        <p:nvSpPr>
+          <p:cNvPr id="4" name="TextBox 3">
+            <a:extLst>
+              <a:ext uri="{FF2B5EF4-FFF2-40B4-BE49-F238E27FC236}">
+                <a16:creationId xmlns:a16="http://schemas.microsoft.com/office/drawing/2014/main" id="{EE2AF03F-2397-C4A7-29C7-63BAB324950E}"/>
+              </a:ext>
+            </a:extLst>
+          </p:cNvPr>
+          <p:cNvSpPr txBox="1"/>
+          <p:nvPr/>
+        </p:nvSpPr>
+        <p:spPr>
+          <a:xfrm>
+            <a:off x="3588513" y="1275476"/>
+            <a:ext cx="1063817" cy="369332"/>
+          </a:xfrm>
+          <a:prstGeom prst="rect">
+            <a:avLst/>
+          </a:prstGeom>
+          <a:noFill/>
+        </p:spPr>
+        <p:txBody>
+          <a:bodyPr wrap="none" rtlCol="0">
+            <a:spAutoFit/>
+          </a:bodyPr>
+          <a:lstStyle/>
+          <a:p>
+            <a:r>
+              <a:rPr lang="en-DE" dirty="0"/>
+              <a:t>&lt;table1&gt;</a:t>
+            </a:r>
+          </a:p>
+        </p:txBody>
+      </p:sp>
+      <p:cxnSp>
+        <p:nvCxnSpPr>
+          <p:cNvPr id="3" name="Elbow Connector 2">
+            <a:extLst>
+              <a:ext uri="{FF2B5EF4-FFF2-40B4-BE49-F238E27FC236}">
+                <a16:creationId xmlns:a16="http://schemas.microsoft.com/office/drawing/2014/main" id="{41A8D49E-2C1C-B5CE-9C2B-23007060359C}"/>
+              </a:ext>
+            </a:extLst>
+          </p:cNvPr>
+          <p:cNvCxnSpPr>
+            <a:stCxn id="4" idx="2"/>
+            <a:endCxn id="9" idx="0"/>
+          </p:cNvCxnSpPr>
+          <p:nvPr/>
+        </p:nvCxnSpPr>
+        <p:spPr>
+          <a:xfrm rot="5400000">
+            <a:off x="2918658" y="731036"/>
+            <a:ext cx="287993" cy="2115536"/>
+          </a:xfrm>
+          <a:prstGeom prst="bentConnector3">
+            <a:avLst/>
+          </a:prstGeom>
+          <a:ln>
+            <a:solidFill>
+              <a:schemeClr val="tx1"/>
+            </a:solidFill>
+          </a:ln>
+        </p:spPr>
+        <p:style>
+          <a:lnRef idx="2">
+            <a:schemeClr val="accent1"/>
+          </a:lnRef>
+          <a:fillRef idx="0">
+            <a:schemeClr val="accent1"/>
+          </a:fillRef>
+          <a:effectRef idx="1">
+            <a:schemeClr val="accent1"/>
+          </a:effectRef>
+          <a:fontRef idx="minor">
+            <a:schemeClr val="tx1"/>
+          </a:fontRef>
+        </p:style>
+      </p:cxnSp>
+      <p:cxnSp>
+        <p:nvCxnSpPr>
+          <p:cNvPr id="7" name="Elbow Connector 6">
+            <a:extLst>
+              <a:ext uri="{FF2B5EF4-FFF2-40B4-BE49-F238E27FC236}">
+                <a16:creationId xmlns:a16="http://schemas.microsoft.com/office/drawing/2014/main" id="{245B7F51-E8A5-8186-D495-50300F18DA16}"/>
+              </a:ext>
+            </a:extLst>
+          </p:cNvPr>
+          <p:cNvCxnSpPr>
+            <a:stCxn id="4" idx="2"/>
+            <a:endCxn id="13" idx="0"/>
+          </p:cNvCxnSpPr>
+          <p:nvPr/>
+        </p:nvCxnSpPr>
+        <p:spPr>
+          <a:xfrm rot="5400000">
+            <a:off x="3641696" y="1454074"/>
+            <a:ext cx="287993" cy="669460"/>
+          </a:xfrm>
+          <a:prstGeom prst="bentConnector3">
+            <a:avLst/>
+          </a:prstGeom>
+          <a:ln>
+            <a:solidFill>
+              <a:schemeClr val="tx1"/>
+            </a:solidFill>
+          </a:ln>
+        </p:spPr>
+        <p:style>
+          <a:lnRef idx="2">
+            <a:schemeClr val="accent1"/>
+          </a:lnRef>
+          <a:fillRef idx="0">
+            <a:schemeClr val="accent1"/>
+          </a:fillRef>
+          <a:effectRef idx="1">
+            <a:schemeClr val="accent1"/>
+          </a:effectRef>
+          <a:fontRef idx="minor">
+            <a:schemeClr val="tx1"/>
+          </a:fontRef>
+        </p:style>
+      </p:cxnSp>
+      <p:cxnSp>
+        <p:nvCxnSpPr>
+          <p:cNvPr id="16" name="Elbow Connector 15">
+            <a:extLst>
+              <a:ext uri="{FF2B5EF4-FFF2-40B4-BE49-F238E27FC236}">
+                <a16:creationId xmlns:a16="http://schemas.microsoft.com/office/drawing/2014/main" id="{ED6A1CCB-0641-ED50-B208-B1D56A4396A4}"/>
+              </a:ext>
+            </a:extLst>
+          </p:cNvPr>
+          <p:cNvCxnSpPr>
+            <a:stCxn id="4" idx="2"/>
+            <a:endCxn id="17" idx="0"/>
+          </p:cNvCxnSpPr>
+          <p:nvPr/>
+        </p:nvCxnSpPr>
+        <p:spPr>
+          <a:xfrm rot="16200000" flipH="1">
+            <a:off x="4314692" y="1450538"/>
+            <a:ext cx="309960" cy="698500"/>
+          </a:xfrm>
+          <a:prstGeom prst="bentConnector3">
+            <a:avLst/>
+          </a:prstGeom>
+          <a:ln>
+            <a:solidFill>
+              <a:schemeClr val="tx1"/>
+            </a:solidFill>
+          </a:ln>
+        </p:spPr>
+        <p:style>
+          <a:lnRef idx="2">
+            <a:schemeClr val="accent1"/>
+          </a:lnRef>
+          <a:fillRef idx="0">
+            <a:schemeClr val="accent1"/>
+          </a:fillRef>
+          <a:effectRef idx="1">
+            <a:schemeClr val="accent1"/>
+          </a:effectRef>
+          <a:fontRef idx="minor">
+            <a:schemeClr val="tx1"/>
+          </a:fontRef>
+        </p:style>
+      </p:cxnSp>
+      <p:cxnSp>
+        <p:nvCxnSpPr>
+          <p:cNvPr id="20" name="Elbow Connector 19">
+            <a:extLst>
+              <a:ext uri="{FF2B5EF4-FFF2-40B4-BE49-F238E27FC236}">
+                <a16:creationId xmlns:a16="http://schemas.microsoft.com/office/drawing/2014/main" id="{36A7C78C-B2D9-312D-98B7-2EED2BBF8086}"/>
+              </a:ext>
+            </a:extLst>
+          </p:cNvPr>
+          <p:cNvCxnSpPr>
+            <a:stCxn id="4" idx="2"/>
+            <a:endCxn id="24" idx="0"/>
+          </p:cNvCxnSpPr>
+          <p:nvPr/>
+        </p:nvCxnSpPr>
+        <p:spPr>
+          <a:xfrm rot="16200000" flipH="1">
+            <a:off x="5018342" y="746888"/>
+            <a:ext cx="299661" cy="2095500"/>
+          </a:xfrm>
+          <a:prstGeom prst="bentConnector3">
+            <a:avLst/>
+          </a:prstGeom>
+          <a:ln>
+            <a:solidFill>
+              <a:schemeClr val="tx1"/>
+            </a:solidFill>
+          </a:ln>
+        </p:spPr>
+        <p:style>
+          <a:lnRef idx="2">
+            <a:schemeClr val="accent1"/>
+          </a:lnRef>
+          <a:fillRef idx="0">
+            <a:schemeClr val="accent1"/>
+          </a:fillRef>
+          <a:effectRef idx="1">
+            <a:schemeClr val="accent1"/>
+          </a:effectRef>
+          <a:fontRef idx="minor">
+            <a:schemeClr val="tx1"/>
+          </a:fontRef>
+        </p:style>
+      </p:cxnSp>
+    </p:spTree>
+    <p:extLst>
+      <p:ext uri="{BB962C8B-B14F-4D97-AF65-F5344CB8AC3E}">
+        <p14:creationId xmlns:p14="http://schemas.microsoft.com/office/powerpoint/2010/main" val="2519244510"/>
+      </p:ext>
+    </p:extLst>
+  </p:cSld>
+  <p:clrMapOvr>
+    <a:masterClrMapping/>
+  </p:clrMapOvr>
+</p:sld>
+</file>
+
+<file path=ppt/slides/slide8.xml><?xml version="1.0" encoding="utf-8"?>
+<p:sld xmlns:a="http://schemas.openxmlformats.org/drawingml/2006/main" xmlns:r="http://schemas.openxmlformats.org/officeDocument/2006/relationships" xmlns:p="http://schemas.openxmlformats.org/presentationml/2006/main">
+  <p:cSld>
+    <p:spTree>
+      <p:nvGrpSpPr>
+        <p:cNvPr id="1" name=""/>
+        <p:cNvGrpSpPr/>
+        <p:nvPr/>
+      </p:nvGrpSpPr>
+      <p:grpSpPr>
+        <a:xfrm>
+          <a:off x="0" y="0"/>
+          <a:ext cx="0" cy="0"/>
+          <a:chOff x="0" y="0"/>
+          <a:chExt cx="0" cy="0"/>
+        </a:xfrm>
+      </p:grpSpPr>
+      <p:sp>
+        <p:nvSpPr>
           <p:cNvPr id="2" name="Rectangle 1">
             <a:extLst>
               <a:ext uri="{FF2B5EF4-FFF2-40B4-BE49-F238E27FC236}">
@@ -12309,7 +14325,7 @@
 </p:sld>
 </file>
 
-<file path=ppt/slides/slide8.xml><?xml version="1.0" encoding="utf-8"?>
+<file path=ppt/slides/slide9.xml><?xml version="1.0" encoding="utf-8"?>
 <p:sld xmlns:a="http://schemas.openxmlformats.org/drawingml/2006/main" xmlns:r="http://schemas.openxmlformats.org/officeDocument/2006/relationships" xmlns:p="http://schemas.openxmlformats.org/presentationml/2006/main">
   <p:cSld>
     <p:spTree>

</xml_diff>